<commit_message>
Weekly updates and presentation reorganization
</commit_message>
<xml_diff>
--- a/Presentations and Meeting Notes/2017-2018/Forum Topics/Block-Chain.pptx
+++ b/Presentations and Meeting Notes/2017-2018/Forum Topics/Block-Chain.pptx
@@ -5,12 +5,29 @@
     <p:sldMasterId id="2147483738" r:id="rId1"/>
   </p:sldMasterIdLst>
   <p:notesMasterIdLst>
-    <p:notesMasterId r:id="rId5"/>
+    <p:notesMasterId r:id="rId22"/>
   </p:notesMasterIdLst>
   <p:sldIdLst>
     <p:sldId id="256" r:id="rId2"/>
-    <p:sldId id="322" r:id="rId3"/>
-    <p:sldId id="323" r:id="rId4"/>
+    <p:sldId id="257" r:id="rId3"/>
+    <p:sldId id="258" r:id="rId4"/>
+    <p:sldId id="259" r:id="rId5"/>
+    <p:sldId id="260" r:id="rId6"/>
+    <p:sldId id="261" r:id="rId7"/>
+    <p:sldId id="262" r:id="rId8"/>
+    <p:sldId id="263" r:id="rId9"/>
+    <p:sldId id="264" r:id="rId10"/>
+    <p:sldId id="265" r:id="rId11"/>
+    <p:sldId id="266" r:id="rId12"/>
+    <p:sldId id="267" r:id="rId13"/>
+    <p:sldId id="268" r:id="rId14"/>
+    <p:sldId id="269" r:id="rId15"/>
+    <p:sldId id="270" r:id="rId16"/>
+    <p:sldId id="271" r:id="rId17"/>
+    <p:sldId id="272" r:id="rId18"/>
+    <p:sldId id="273" r:id="rId19"/>
+    <p:sldId id="274" r:id="rId20"/>
+    <p:sldId id="275" r:id="rId21"/>
   </p:sldIdLst>
   <p:sldSz cx="9144000" cy="6858000" type="screen4x3"/>
   <p:notesSz cx="6858000" cy="9144000"/>
@@ -119,8 +136,25 @@
         </p14:section>
         <p14:section name="Open Forum Topic" id="{0F74B9C7-78FA-419E-989D-188EF831C3B4}">
           <p14:sldIdLst>
-            <p14:sldId id="322"/>
-            <p14:sldId id="323"/>
+            <p14:sldId id="257"/>
+            <p14:sldId id="258"/>
+            <p14:sldId id="259"/>
+            <p14:sldId id="260"/>
+            <p14:sldId id="261"/>
+            <p14:sldId id="262"/>
+            <p14:sldId id="263"/>
+            <p14:sldId id="264"/>
+            <p14:sldId id="265"/>
+            <p14:sldId id="266"/>
+            <p14:sldId id="267"/>
+            <p14:sldId id="268"/>
+            <p14:sldId id="269"/>
+            <p14:sldId id="270"/>
+            <p14:sldId id="271"/>
+            <p14:sldId id="272"/>
+            <p14:sldId id="273"/>
+            <p14:sldId id="274"/>
+            <p14:sldId id="275"/>
           </p14:sldIdLst>
         </p14:section>
       </p14:sectionLst>
@@ -218,7 +252,7 @@
           <a:p>
             <a:fld id="{F09E0660-2AAC-E146-85F7-7906298D2758}" type="datetimeFigureOut">
               <a:rPr lang="en-US" smtClean="0"/>
-              <a:t>1/19/2018</a:t>
+              <a:t>1/28/2018</a:t>
             </a:fld>
             <a:endParaRPr lang="en-US"/>
           </a:p>
@@ -485,6 +519,468 @@
 </p:notesMaster>
 </file>
 
+<file path=ppt/notesSlides/notesSlide1.xml><?xml version="1.0" encoding="utf-8"?>
+<p:notes xmlns:a="http://schemas.openxmlformats.org/drawingml/2006/main" xmlns:r="http://schemas.openxmlformats.org/officeDocument/2006/relationships" xmlns:p="http://schemas.openxmlformats.org/presentationml/2006/main">
+  <p:cSld>
+    <p:spTree>
+      <p:nvGrpSpPr>
+        <p:cNvPr id="1" name=""/>
+        <p:cNvGrpSpPr/>
+        <p:nvPr/>
+      </p:nvGrpSpPr>
+      <p:grpSpPr>
+        <a:xfrm>
+          <a:off x="0" y="0"/>
+          <a:ext cx="0" cy="0"/>
+          <a:chOff x="0" y="0"/>
+          <a:chExt cx="0" cy="0"/>
+        </a:xfrm>
+      </p:grpSpPr>
+      <p:sp>
+        <p:nvSpPr>
+          <p:cNvPr id="2" name="Slide Image Placeholder 1"/>
+          <p:cNvSpPr>
+            <a:spLocks noGrp="1" noRot="1" noChangeAspect="1"/>
+          </p:cNvSpPr>
+          <p:nvPr>
+            <p:ph type="sldImg"/>
+          </p:nvPr>
+        </p:nvSpPr>
+        <p:spPr/>
+      </p:sp>
+      <p:sp>
+        <p:nvSpPr>
+          <p:cNvPr id="3" name="Notes Placeholder 2"/>
+          <p:cNvSpPr>
+            <a:spLocks noGrp="1"/>
+          </p:cNvSpPr>
+          <p:nvPr>
+            <p:ph type="body" idx="1"/>
+          </p:nvPr>
+        </p:nvSpPr>
+        <p:spPr/>
+        <p:txBody>
+          <a:bodyPr/>
+          <a:lstStyle/>
+          <a:p>
+            <a:r>
+              <a:rPr lang="en-US" dirty="0"/>
+              <a:t>Poll room for who’s heard of currency and what they have heard about it</a:t>
+            </a:r>
+          </a:p>
+          <a:p>
+            <a:r>
+              <a:rPr lang="en-US" dirty="0"/>
+              <a:t>I don’t claim to be an expert, I’ve just read a lot about it (Give credibility)</a:t>
+            </a:r>
+          </a:p>
+        </p:txBody>
+      </p:sp>
+      <p:sp>
+        <p:nvSpPr>
+          <p:cNvPr id="4" name="Slide Number Placeholder 3"/>
+          <p:cNvSpPr>
+            <a:spLocks noGrp="1"/>
+          </p:cNvSpPr>
+          <p:nvPr>
+            <p:ph type="sldNum" sz="quarter" idx="10"/>
+          </p:nvPr>
+        </p:nvSpPr>
+        <p:spPr/>
+        <p:txBody>
+          <a:bodyPr/>
+          <a:lstStyle/>
+          <a:p>
+            <a:pPr marL="0" marR="0" lvl="0" indent="0" algn="r" defTabSz="457200" rtl="0" eaLnBrk="1" fontAlgn="auto" latinLnBrk="0" hangingPunct="1">
+              <a:lnSpc>
+                <a:spcPct val="100000"/>
+              </a:lnSpc>
+              <a:spcBef>
+                <a:spcPts val="0"/>
+              </a:spcBef>
+              <a:spcAft>
+                <a:spcPts val="0"/>
+              </a:spcAft>
+              <a:buClrTx/>
+              <a:buSzTx/>
+              <a:buFontTx/>
+              <a:buNone/>
+              <a:tabLst/>
+              <a:defRPr/>
+            </a:pPr>
+            <a:fld id="{54849C72-B790-6B4E-A13F-357AB5437C4C}" type="slidenum">
+              <a:rPr kumimoji="0" lang="en-US" sz="1200" b="0" i="0" u="none" strike="noStrike" kern="1200" cap="none" spc="0" normalizeH="0" baseline="0" noProof="0" smtClean="0">
+                <a:ln>
+                  <a:noFill/>
+                </a:ln>
+                <a:solidFill>
+                  <a:prstClr val="black"/>
+                </a:solidFill>
+                <a:effectLst/>
+                <a:uLnTx/>
+                <a:uFillTx/>
+                <a:latin typeface="Calibri" panose="020F0502020204030204"/>
+                <a:ea typeface="+mn-ea"/>
+                <a:cs typeface="+mn-cs"/>
+              </a:rPr>
+              <a:pPr marL="0" marR="0" lvl="0" indent="0" algn="r" defTabSz="457200" rtl="0" eaLnBrk="1" fontAlgn="auto" latinLnBrk="0" hangingPunct="1">
+                <a:lnSpc>
+                  <a:spcPct val="100000"/>
+                </a:lnSpc>
+                <a:spcBef>
+                  <a:spcPts val="0"/>
+                </a:spcBef>
+                <a:spcAft>
+                  <a:spcPts val="0"/>
+                </a:spcAft>
+                <a:buClrTx/>
+                <a:buSzTx/>
+                <a:buFontTx/>
+                <a:buNone/>
+                <a:tabLst/>
+                <a:defRPr/>
+              </a:pPr>
+              <a:t>2</a:t>
+            </a:fld>
+            <a:endParaRPr kumimoji="0" lang="en-US" sz="1200" b="0" i="0" u="none" strike="noStrike" kern="1200" cap="none" spc="0" normalizeH="0" baseline="0" noProof="0">
+              <a:ln>
+                <a:noFill/>
+              </a:ln>
+              <a:solidFill>
+                <a:prstClr val="black"/>
+              </a:solidFill>
+              <a:effectLst/>
+              <a:uLnTx/>
+              <a:uFillTx/>
+              <a:latin typeface="Calibri" panose="020F0502020204030204"/>
+              <a:ea typeface="+mn-ea"/>
+              <a:cs typeface="+mn-cs"/>
+            </a:endParaRPr>
+          </a:p>
+        </p:txBody>
+      </p:sp>
+    </p:spTree>
+    <p:extLst>
+      <p:ext uri="{BB962C8B-B14F-4D97-AF65-F5344CB8AC3E}">
+        <p14:creationId xmlns:p14="http://schemas.microsoft.com/office/powerpoint/2010/main" val="3523454375"/>
+      </p:ext>
+    </p:extLst>
+  </p:cSld>
+  <p:clrMapOvr>
+    <a:masterClrMapping/>
+  </p:clrMapOvr>
+</p:notes>
+</file>
+
+<file path=ppt/notesSlides/notesSlide2.xml><?xml version="1.0" encoding="utf-8"?>
+<p:notes xmlns:a="http://schemas.openxmlformats.org/drawingml/2006/main" xmlns:r="http://schemas.openxmlformats.org/officeDocument/2006/relationships" xmlns:p="http://schemas.openxmlformats.org/presentationml/2006/main">
+  <p:cSld>
+    <p:spTree>
+      <p:nvGrpSpPr>
+        <p:cNvPr id="1" name=""/>
+        <p:cNvGrpSpPr/>
+        <p:nvPr/>
+      </p:nvGrpSpPr>
+      <p:grpSpPr>
+        <a:xfrm>
+          <a:off x="0" y="0"/>
+          <a:ext cx="0" cy="0"/>
+          <a:chOff x="0" y="0"/>
+          <a:chExt cx="0" cy="0"/>
+        </a:xfrm>
+      </p:grpSpPr>
+      <p:sp>
+        <p:nvSpPr>
+          <p:cNvPr id="2" name="Slide Image Placeholder 1"/>
+          <p:cNvSpPr>
+            <a:spLocks noGrp="1" noRot="1" noChangeAspect="1"/>
+          </p:cNvSpPr>
+          <p:nvPr>
+            <p:ph type="sldImg"/>
+          </p:nvPr>
+        </p:nvSpPr>
+        <p:spPr/>
+      </p:sp>
+      <p:sp>
+        <p:nvSpPr>
+          <p:cNvPr id="3" name="Notes Placeholder 2"/>
+          <p:cNvSpPr>
+            <a:spLocks noGrp="1"/>
+          </p:cNvSpPr>
+          <p:nvPr>
+            <p:ph type="body" idx="1"/>
+          </p:nvPr>
+        </p:nvSpPr>
+        <p:spPr/>
+        <p:txBody>
+          <a:bodyPr/>
+          <a:lstStyle/>
+          <a:p>
+            <a:r>
+              <a:rPr lang="en-US" dirty="0"/>
+              <a:t>BITCOIN AND BLOCKCHAIN ARE NOT THE SAME THING</a:t>
+            </a:r>
+          </a:p>
+          <a:p>
+            <a:r>
+              <a:rPr lang="en-US" dirty="0"/>
+              <a:t>Blockchain technology is not solely a currency</a:t>
+            </a:r>
+          </a:p>
+          <a:p>
+            <a:endParaRPr lang="en-US" dirty="0"/>
+          </a:p>
+        </p:txBody>
+      </p:sp>
+      <p:sp>
+        <p:nvSpPr>
+          <p:cNvPr id="4" name="Slide Number Placeholder 3"/>
+          <p:cNvSpPr>
+            <a:spLocks noGrp="1"/>
+          </p:cNvSpPr>
+          <p:nvPr>
+            <p:ph type="sldNum" sz="quarter" idx="10"/>
+          </p:nvPr>
+        </p:nvSpPr>
+        <p:spPr/>
+        <p:txBody>
+          <a:bodyPr/>
+          <a:lstStyle/>
+          <a:p>
+            <a:pPr marL="0" marR="0" lvl="0" indent="0" algn="r" defTabSz="457200" rtl="0" eaLnBrk="1" fontAlgn="auto" latinLnBrk="0" hangingPunct="1">
+              <a:lnSpc>
+                <a:spcPct val="100000"/>
+              </a:lnSpc>
+              <a:spcBef>
+                <a:spcPts val="0"/>
+              </a:spcBef>
+              <a:spcAft>
+                <a:spcPts val="0"/>
+              </a:spcAft>
+              <a:buClrTx/>
+              <a:buSzTx/>
+              <a:buFontTx/>
+              <a:buNone/>
+              <a:tabLst/>
+              <a:defRPr/>
+            </a:pPr>
+            <a:fld id="{54849C72-B790-6B4E-A13F-357AB5437C4C}" type="slidenum">
+              <a:rPr kumimoji="0" lang="en-US" sz="1200" b="0" i="0" u="none" strike="noStrike" kern="1200" cap="none" spc="0" normalizeH="0" baseline="0" noProof="0" smtClean="0">
+                <a:ln>
+                  <a:noFill/>
+                </a:ln>
+                <a:solidFill>
+                  <a:prstClr val="black"/>
+                </a:solidFill>
+                <a:effectLst/>
+                <a:uLnTx/>
+                <a:uFillTx/>
+                <a:latin typeface="Calibri" panose="020F0502020204030204"/>
+                <a:ea typeface="+mn-ea"/>
+                <a:cs typeface="+mn-cs"/>
+              </a:rPr>
+              <a:pPr marL="0" marR="0" lvl="0" indent="0" algn="r" defTabSz="457200" rtl="0" eaLnBrk="1" fontAlgn="auto" latinLnBrk="0" hangingPunct="1">
+                <a:lnSpc>
+                  <a:spcPct val="100000"/>
+                </a:lnSpc>
+                <a:spcBef>
+                  <a:spcPts val="0"/>
+                </a:spcBef>
+                <a:spcAft>
+                  <a:spcPts val="0"/>
+                </a:spcAft>
+                <a:buClrTx/>
+                <a:buSzTx/>
+                <a:buFontTx/>
+                <a:buNone/>
+                <a:tabLst/>
+                <a:defRPr/>
+              </a:pPr>
+              <a:t>3</a:t>
+            </a:fld>
+            <a:endParaRPr kumimoji="0" lang="en-US" sz="1200" b="0" i="0" u="none" strike="noStrike" kern="1200" cap="none" spc="0" normalizeH="0" baseline="0" noProof="0">
+              <a:ln>
+                <a:noFill/>
+              </a:ln>
+              <a:solidFill>
+                <a:prstClr val="black"/>
+              </a:solidFill>
+              <a:effectLst/>
+              <a:uLnTx/>
+              <a:uFillTx/>
+              <a:latin typeface="Calibri" panose="020F0502020204030204"/>
+              <a:ea typeface="+mn-ea"/>
+              <a:cs typeface="+mn-cs"/>
+            </a:endParaRPr>
+          </a:p>
+        </p:txBody>
+      </p:sp>
+    </p:spTree>
+    <p:extLst>
+      <p:ext uri="{BB962C8B-B14F-4D97-AF65-F5344CB8AC3E}">
+        <p14:creationId xmlns:p14="http://schemas.microsoft.com/office/powerpoint/2010/main" val="3200003784"/>
+      </p:ext>
+    </p:extLst>
+  </p:cSld>
+  <p:clrMapOvr>
+    <a:masterClrMapping/>
+  </p:clrMapOvr>
+</p:notes>
+</file>
+
+<file path=ppt/notesSlides/notesSlide3.xml><?xml version="1.0" encoding="utf-8"?>
+<p:notes xmlns:a="http://schemas.openxmlformats.org/drawingml/2006/main" xmlns:r="http://schemas.openxmlformats.org/officeDocument/2006/relationships" xmlns:p="http://schemas.openxmlformats.org/presentationml/2006/main">
+  <p:cSld>
+    <p:spTree>
+      <p:nvGrpSpPr>
+        <p:cNvPr id="1" name=""/>
+        <p:cNvGrpSpPr/>
+        <p:nvPr/>
+      </p:nvGrpSpPr>
+      <p:grpSpPr>
+        <a:xfrm>
+          <a:off x="0" y="0"/>
+          <a:ext cx="0" cy="0"/>
+          <a:chOff x="0" y="0"/>
+          <a:chExt cx="0" cy="0"/>
+        </a:xfrm>
+      </p:grpSpPr>
+      <p:sp>
+        <p:nvSpPr>
+          <p:cNvPr id="2" name="Slide Image Placeholder 1"/>
+          <p:cNvSpPr>
+            <a:spLocks noGrp="1" noRot="1" noChangeAspect="1"/>
+          </p:cNvSpPr>
+          <p:nvPr>
+            <p:ph type="sldImg"/>
+          </p:nvPr>
+        </p:nvSpPr>
+        <p:spPr/>
+      </p:sp>
+      <p:sp>
+        <p:nvSpPr>
+          <p:cNvPr id="3" name="Notes Placeholder 2"/>
+          <p:cNvSpPr>
+            <a:spLocks noGrp="1"/>
+          </p:cNvSpPr>
+          <p:nvPr>
+            <p:ph type="body" idx="1"/>
+          </p:nvPr>
+        </p:nvSpPr>
+        <p:spPr/>
+        <p:txBody>
+          <a:bodyPr/>
+          <a:lstStyle/>
+          <a:p>
+            <a:r>
+              <a:rPr lang="en-US" dirty="0"/>
+              <a:t>Explain infographic</a:t>
+            </a:r>
+          </a:p>
+          <a:p>
+            <a:r>
+              <a:rPr lang="en-US" dirty="0"/>
+              <a:t>Blockchain is more or less a theory- implemented as a technology</a:t>
+            </a:r>
+          </a:p>
+        </p:txBody>
+      </p:sp>
+      <p:sp>
+        <p:nvSpPr>
+          <p:cNvPr id="4" name="Slide Number Placeholder 3"/>
+          <p:cNvSpPr>
+            <a:spLocks noGrp="1"/>
+          </p:cNvSpPr>
+          <p:nvPr>
+            <p:ph type="sldNum" sz="quarter" idx="10"/>
+          </p:nvPr>
+        </p:nvSpPr>
+        <p:spPr/>
+        <p:txBody>
+          <a:bodyPr/>
+          <a:lstStyle/>
+          <a:p>
+            <a:pPr marL="0" marR="0" lvl="0" indent="0" algn="r" defTabSz="457200" rtl="0" eaLnBrk="1" fontAlgn="auto" latinLnBrk="0" hangingPunct="1">
+              <a:lnSpc>
+                <a:spcPct val="100000"/>
+              </a:lnSpc>
+              <a:spcBef>
+                <a:spcPts val="0"/>
+              </a:spcBef>
+              <a:spcAft>
+                <a:spcPts val="0"/>
+              </a:spcAft>
+              <a:buClrTx/>
+              <a:buSzTx/>
+              <a:buFontTx/>
+              <a:buNone/>
+              <a:tabLst/>
+              <a:defRPr/>
+            </a:pPr>
+            <a:fld id="{54849C72-B790-6B4E-A13F-357AB5437C4C}" type="slidenum">
+              <a:rPr kumimoji="0" lang="en-US" sz="1200" b="0" i="0" u="none" strike="noStrike" kern="1200" cap="none" spc="0" normalizeH="0" baseline="0" noProof="0" smtClean="0">
+                <a:ln>
+                  <a:noFill/>
+                </a:ln>
+                <a:solidFill>
+                  <a:prstClr val="black"/>
+                </a:solidFill>
+                <a:effectLst/>
+                <a:uLnTx/>
+                <a:uFillTx/>
+                <a:latin typeface="Calibri" panose="020F0502020204030204"/>
+                <a:ea typeface="+mn-ea"/>
+                <a:cs typeface="+mn-cs"/>
+              </a:rPr>
+              <a:pPr marL="0" marR="0" lvl="0" indent="0" algn="r" defTabSz="457200" rtl="0" eaLnBrk="1" fontAlgn="auto" latinLnBrk="0" hangingPunct="1">
+                <a:lnSpc>
+                  <a:spcPct val="100000"/>
+                </a:lnSpc>
+                <a:spcBef>
+                  <a:spcPts val="0"/>
+                </a:spcBef>
+                <a:spcAft>
+                  <a:spcPts val="0"/>
+                </a:spcAft>
+                <a:buClrTx/>
+                <a:buSzTx/>
+                <a:buFontTx/>
+                <a:buNone/>
+                <a:tabLst/>
+                <a:defRPr/>
+              </a:pPr>
+              <a:t>5</a:t>
+            </a:fld>
+            <a:endParaRPr kumimoji="0" lang="en-US" sz="1200" b="0" i="0" u="none" strike="noStrike" kern="1200" cap="none" spc="0" normalizeH="0" baseline="0" noProof="0">
+              <a:ln>
+                <a:noFill/>
+              </a:ln>
+              <a:solidFill>
+                <a:prstClr val="black"/>
+              </a:solidFill>
+              <a:effectLst/>
+              <a:uLnTx/>
+              <a:uFillTx/>
+              <a:latin typeface="Calibri" panose="020F0502020204030204"/>
+              <a:ea typeface="+mn-ea"/>
+              <a:cs typeface="+mn-cs"/>
+            </a:endParaRPr>
+          </a:p>
+        </p:txBody>
+      </p:sp>
+    </p:spTree>
+    <p:extLst>
+      <p:ext uri="{BB962C8B-B14F-4D97-AF65-F5344CB8AC3E}">
+        <p14:creationId xmlns:p14="http://schemas.microsoft.com/office/powerpoint/2010/main" val="2367486668"/>
+      </p:ext>
+    </p:extLst>
+  </p:cSld>
+  <p:clrMapOvr>
+    <a:masterClrMapping/>
+  </p:clrMapOvr>
+</p:notes>
+</file>
+
 <file path=ppt/slideLayouts/slideLayout1.xml><?xml version="1.0" encoding="utf-8"?>
 <p:sldLayout xmlns:a="http://schemas.openxmlformats.org/drawingml/2006/main" xmlns:r="http://schemas.openxmlformats.org/officeDocument/2006/relationships" xmlns:p="http://schemas.openxmlformats.org/presentationml/2006/main" showMasterSp="0" type="title" preserve="1">
   <p:cSld name="Title Slide">
@@ -661,7 +1157,7 @@
           <a:p>
             <a:fld id="{96DFF08F-DC6B-4601-B491-B0F83F6DD2DA}" type="datetimeFigureOut">
               <a:rPr lang="en-US" smtClean="0"/>
-              <a:t>1/19/2018</a:t>
+              <a:t>1/28/2018</a:t>
             </a:fld>
             <a:endParaRPr lang="en-US" dirty="0"/>
           </a:p>
@@ -831,7 +1327,7 @@
           <a:p>
             <a:fld id="{96DFF08F-DC6B-4601-B491-B0F83F6DD2DA}" type="datetimeFigureOut">
               <a:rPr lang="en-US" smtClean="0"/>
-              <a:t>1/19/2018</a:t>
+              <a:t>1/28/2018</a:t>
             </a:fld>
             <a:endParaRPr lang="en-US" dirty="0"/>
           </a:p>
@@ -1054,7 +1550,7 @@
           <a:p>
             <a:fld id="{96DFF08F-DC6B-4601-B491-B0F83F6DD2DA}" type="datetimeFigureOut">
               <a:rPr lang="en-US" smtClean="0"/>
-              <a:t>1/19/2018</a:t>
+              <a:t>1/28/2018</a:t>
             </a:fld>
             <a:endParaRPr lang="en-US" dirty="0"/>
           </a:p>
@@ -1234,7 +1730,7 @@
           <a:p>
             <a:fld id="{96DFF08F-DC6B-4601-B491-B0F83F6DD2DA}" type="datetimeFigureOut">
               <a:rPr lang="en-US" smtClean="0"/>
-              <a:t>1/19/2018</a:t>
+              <a:t>1/28/2018</a:t>
             </a:fld>
             <a:endParaRPr lang="en-US" dirty="0"/>
           </a:p>
@@ -1540,7 +2036,7 @@
           <a:p>
             <a:fld id="{96DFF08F-DC6B-4601-B491-B0F83F6DD2DA}" type="datetimeFigureOut">
               <a:rPr lang="en-US" smtClean="0"/>
-              <a:t>1/19/2018</a:t>
+              <a:t>1/28/2018</a:t>
             </a:fld>
             <a:endParaRPr lang="en-US" dirty="0"/>
           </a:p>
@@ -1844,7 +2340,7 @@
           <a:p>
             <a:fld id="{96DFF08F-DC6B-4601-B491-B0F83F6DD2DA}" type="datetimeFigureOut">
               <a:rPr lang="en-US" smtClean="0"/>
-              <a:t>1/19/2018</a:t>
+              <a:t>1/28/2018</a:t>
             </a:fld>
             <a:endParaRPr lang="en-US" dirty="0"/>
           </a:p>
@@ -2266,7 +2762,7 @@
           <a:p>
             <a:fld id="{96DFF08F-DC6B-4601-B491-B0F83F6DD2DA}" type="datetimeFigureOut">
               <a:rPr lang="en-US" smtClean="0"/>
-              <a:t>1/19/2018</a:t>
+              <a:t>1/28/2018</a:t>
             </a:fld>
             <a:endParaRPr lang="en-US" dirty="0"/>
           </a:p>
@@ -2384,7 +2880,7 @@
           <a:p>
             <a:fld id="{96DFF08F-DC6B-4601-B491-B0F83F6DD2DA}" type="datetimeFigureOut">
               <a:rPr lang="en-US" smtClean="0"/>
-              <a:t>1/19/2018</a:t>
+              <a:t>1/28/2018</a:t>
             </a:fld>
             <a:endParaRPr lang="en-US" dirty="0"/>
           </a:p>
@@ -2479,7 +2975,7 @@
           <a:p>
             <a:fld id="{96DFF08F-DC6B-4601-B491-B0F83F6DD2DA}" type="datetimeFigureOut">
               <a:rPr lang="en-US" smtClean="0"/>
-              <a:t>1/19/2018</a:t>
+              <a:t>1/28/2018</a:t>
             </a:fld>
             <a:endParaRPr lang="en-US" dirty="0"/>
           </a:p>
@@ -2752,7 +3248,7 @@
           <a:p>
             <a:fld id="{96DFF08F-DC6B-4601-B491-B0F83F6DD2DA}" type="datetimeFigureOut">
               <a:rPr lang="en-US" smtClean="0"/>
-              <a:t>1/19/2018</a:t>
+              <a:t>1/28/2018</a:t>
             </a:fld>
             <a:endParaRPr lang="en-US" dirty="0"/>
           </a:p>
@@ -3017,7 +3513,7 @@
           <a:p>
             <a:fld id="{96DFF08F-DC6B-4601-B491-B0F83F6DD2DA}" type="datetimeFigureOut">
               <a:rPr lang="en-US" smtClean="0"/>
-              <a:t>1/19/2018</a:t>
+              <a:t>1/28/2018</a:t>
             </a:fld>
             <a:endParaRPr lang="en-US" dirty="0"/>
           </a:p>
@@ -3267,7 +3763,7 @@
             <a:fld id="{96DFF08F-DC6B-4601-B491-B0F83F6DD2DA}" type="datetimeFigureOut">
               <a:rPr lang="en-US" smtClean="0"/>
               <a:pPr/>
-              <a:t>1/19/2018</a:t>
+              <a:t>1/28/2018</a:t>
             </a:fld>
             <a:endParaRPr lang="en-US" dirty="0"/>
           </a:p>
@@ -3839,6 +4335,1465 @@
 </p:sld>
 </file>
 
+<file path=ppt/slides/slide10.xml><?xml version="1.0" encoding="utf-8"?>
+<p:sld xmlns:a="http://schemas.openxmlformats.org/drawingml/2006/main" xmlns:r="http://schemas.openxmlformats.org/officeDocument/2006/relationships" xmlns:p="http://schemas.openxmlformats.org/presentationml/2006/main">
+  <p:cSld>
+    <p:spTree>
+      <p:nvGrpSpPr>
+        <p:cNvPr id="1" name=""/>
+        <p:cNvGrpSpPr/>
+        <p:nvPr/>
+      </p:nvGrpSpPr>
+      <p:grpSpPr>
+        <a:xfrm>
+          <a:off x="0" y="0"/>
+          <a:ext cx="0" cy="0"/>
+          <a:chOff x="0" y="0"/>
+          <a:chExt cx="0" cy="0"/>
+        </a:xfrm>
+      </p:grpSpPr>
+      <p:sp>
+        <p:nvSpPr>
+          <p:cNvPr id="2" name="Title 1">
+            <a:extLst>
+              <a:ext uri="{FF2B5EF4-FFF2-40B4-BE49-F238E27FC236}">
+                <a16:creationId xmlns:a16="http://schemas.microsoft.com/office/drawing/2014/main" id="{3C496847-C7F8-4379-B926-CD108599D462}"/>
+              </a:ext>
+            </a:extLst>
+          </p:cNvPr>
+          <p:cNvSpPr>
+            <a:spLocks noGrp="1"/>
+          </p:cNvSpPr>
+          <p:nvPr>
+            <p:ph type="title"/>
+          </p:nvPr>
+        </p:nvSpPr>
+        <p:spPr/>
+        <p:txBody>
+          <a:bodyPr/>
+          <a:lstStyle/>
+          <a:p>
+            <a:r>
+              <a:rPr lang="en-US" dirty="0"/>
+              <a:t>How do I mine?</a:t>
+            </a:r>
+          </a:p>
+        </p:txBody>
+      </p:sp>
+      <p:sp>
+        <p:nvSpPr>
+          <p:cNvPr id="3" name="Content Placeholder 2">
+            <a:extLst>
+              <a:ext uri="{FF2B5EF4-FFF2-40B4-BE49-F238E27FC236}">
+                <a16:creationId xmlns:a16="http://schemas.microsoft.com/office/drawing/2014/main" id="{82DC3D41-FA9A-4DF5-AAD8-55A20777A882}"/>
+              </a:ext>
+            </a:extLst>
+          </p:cNvPr>
+          <p:cNvSpPr>
+            <a:spLocks noGrp="1"/>
+          </p:cNvSpPr>
+          <p:nvPr>
+            <p:ph idx="1"/>
+          </p:nvPr>
+        </p:nvSpPr>
+        <p:spPr>
+          <a:xfrm>
+            <a:off x="685019" y="2011680"/>
+            <a:ext cx="3886200" cy="4206240"/>
+          </a:xfrm>
+        </p:spPr>
+        <p:txBody>
+          <a:bodyPr/>
+          <a:lstStyle/>
+          <a:p>
+            <a:r>
+              <a:rPr lang="en-US" dirty="0"/>
+              <a:t>Any computational component technically has the ability to mine</a:t>
+            </a:r>
+          </a:p>
+          <a:p>
+            <a:r>
+              <a:rPr lang="en-US" dirty="0"/>
+              <a:t>Power efficiency is an important variable</a:t>
+            </a:r>
+          </a:p>
+          <a:p>
+            <a:r>
+              <a:rPr lang="en-US" dirty="0"/>
+              <a:t>Different currencies require different equipment</a:t>
+            </a:r>
+          </a:p>
+        </p:txBody>
+      </p:sp>
+      <p:pic>
+        <p:nvPicPr>
+          <p:cNvPr id="4" name="Picture 3">
+            <a:extLst>
+              <a:ext uri="{FF2B5EF4-FFF2-40B4-BE49-F238E27FC236}">
+                <a16:creationId xmlns:a16="http://schemas.microsoft.com/office/drawing/2014/main" id="{CBCA8CEC-5B0F-4DCF-B5B9-38F74BF4D0D1}"/>
+              </a:ext>
+            </a:extLst>
+          </p:cNvPr>
+          <p:cNvPicPr>
+            <a:picLocks noChangeAspect="1"/>
+          </p:cNvPicPr>
+          <p:nvPr/>
+        </p:nvPicPr>
+        <p:blipFill>
+          <a:blip r:embed="rId2"/>
+          <a:stretch>
+            <a:fillRect/>
+          </a:stretch>
+        </p:blipFill>
+        <p:spPr>
+          <a:xfrm>
+            <a:off x="4571219" y="2011680"/>
+            <a:ext cx="4096035" cy="4032857"/>
+          </a:xfrm>
+          <a:prstGeom prst="rect">
+            <a:avLst/>
+          </a:prstGeom>
+        </p:spPr>
+      </p:pic>
+    </p:spTree>
+    <p:extLst>
+      <p:ext uri="{BB962C8B-B14F-4D97-AF65-F5344CB8AC3E}">
+        <p14:creationId xmlns:p14="http://schemas.microsoft.com/office/powerpoint/2010/main" val="3871508992"/>
+      </p:ext>
+    </p:extLst>
+  </p:cSld>
+  <p:clrMapOvr>
+    <a:masterClrMapping/>
+  </p:clrMapOvr>
+</p:sld>
+</file>
+
+<file path=ppt/slides/slide11.xml><?xml version="1.0" encoding="utf-8"?>
+<p:sld xmlns:a="http://schemas.openxmlformats.org/drawingml/2006/main" xmlns:r="http://schemas.openxmlformats.org/officeDocument/2006/relationships" xmlns:p="http://schemas.openxmlformats.org/presentationml/2006/main">
+  <p:cSld>
+    <p:spTree>
+      <p:nvGrpSpPr>
+        <p:cNvPr id="1" name=""/>
+        <p:cNvGrpSpPr/>
+        <p:nvPr/>
+      </p:nvGrpSpPr>
+      <p:grpSpPr>
+        <a:xfrm>
+          <a:off x="0" y="0"/>
+          <a:ext cx="0" cy="0"/>
+          <a:chOff x="0" y="0"/>
+          <a:chExt cx="0" cy="0"/>
+        </a:xfrm>
+      </p:grpSpPr>
+      <p:sp>
+        <p:nvSpPr>
+          <p:cNvPr id="2" name="Title 1">
+            <a:extLst>
+              <a:ext uri="{FF2B5EF4-FFF2-40B4-BE49-F238E27FC236}">
+                <a16:creationId xmlns:a16="http://schemas.microsoft.com/office/drawing/2014/main" id="{2A6E4CC5-5A56-40A3-B1B8-A2597BE7243E}"/>
+              </a:ext>
+            </a:extLst>
+          </p:cNvPr>
+          <p:cNvSpPr>
+            <a:spLocks noGrp="1"/>
+          </p:cNvSpPr>
+          <p:nvPr>
+            <p:ph type="title"/>
+          </p:nvPr>
+        </p:nvSpPr>
+        <p:spPr/>
+        <p:txBody>
+          <a:bodyPr/>
+          <a:lstStyle/>
+          <a:p>
+            <a:r>
+              <a:rPr lang="en-US" dirty="0"/>
+              <a:t>(</a:t>
+            </a:r>
+            <a:r>
+              <a:rPr lang="en-US" dirty="0" err="1"/>
+              <a:t>PoW</a:t>
+            </a:r>
+            <a:r>
+              <a:rPr lang="en-US" dirty="0"/>
+              <a:t>) Pros and cons</a:t>
+            </a:r>
+          </a:p>
+        </p:txBody>
+      </p:sp>
+      <p:sp>
+        <p:nvSpPr>
+          <p:cNvPr id="3" name="Content Placeholder 2">
+            <a:extLst>
+              <a:ext uri="{FF2B5EF4-FFF2-40B4-BE49-F238E27FC236}">
+                <a16:creationId xmlns:a16="http://schemas.microsoft.com/office/drawing/2014/main" id="{416C2B2A-4C85-4450-BE7A-67F34F5E643A}"/>
+              </a:ext>
+            </a:extLst>
+          </p:cNvPr>
+          <p:cNvSpPr>
+            <a:spLocks noGrp="1"/>
+          </p:cNvSpPr>
+          <p:nvPr>
+            <p:ph idx="1"/>
+          </p:nvPr>
+        </p:nvSpPr>
+        <p:spPr/>
+        <p:txBody>
+          <a:bodyPr>
+            <a:normAutofit lnSpcReduction="10000"/>
+          </a:bodyPr>
+          <a:lstStyle/>
+          <a:p>
+            <a:r>
+              <a:rPr lang="en-US" sz="2800" dirty="0"/>
+              <a:t>In 2015, statistics say 1.5 American households could have been powered in one day with the power it took to mine one Bitcoin. (</a:t>
+            </a:r>
+            <a:r>
+              <a:rPr lang="en-US" sz="2800" dirty="0">
+                <a:hlinkClick r:id="rId2"/>
+              </a:rPr>
+              <a:t>https://blockgeeks.com/bitcoins-energy-consumption/</a:t>
+            </a:r>
+            <a:r>
+              <a:rPr lang="en-US" sz="2800" dirty="0"/>
+              <a:t>)</a:t>
+            </a:r>
+          </a:p>
+          <a:p>
+            <a:r>
+              <a:rPr lang="en-US" sz="2800" dirty="0"/>
+              <a:t>Very secure- as an attack would require more resources than would likely be gained</a:t>
+            </a:r>
+          </a:p>
+          <a:p>
+            <a:r>
+              <a:rPr lang="en-US" sz="2800" dirty="0"/>
+              <a:t>Is difficult to scale, average block time of Bitcoin is now 10 minutes</a:t>
+            </a:r>
+          </a:p>
+          <a:p>
+            <a:r>
+              <a:rPr lang="en-US" sz="2800" dirty="0"/>
+              <a:t>Vulnerable to a 51% attack</a:t>
+            </a:r>
+          </a:p>
+          <a:p>
+            <a:endParaRPr lang="en-US" dirty="0"/>
+          </a:p>
+        </p:txBody>
+      </p:sp>
+    </p:spTree>
+    <p:extLst>
+      <p:ext uri="{BB962C8B-B14F-4D97-AF65-F5344CB8AC3E}">
+        <p14:creationId xmlns:p14="http://schemas.microsoft.com/office/powerpoint/2010/main" val="852848987"/>
+      </p:ext>
+    </p:extLst>
+  </p:cSld>
+  <p:clrMapOvr>
+    <a:masterClrMapping/>
+  </p:clrMapOvr>
+</p:sld>
+</file>
+
+<file path=ppt/slides/slide12.xml><?xml version="1.0" encoding="utf-8"?>
+<p:sld xmlns:a="http://schemas.openxmlformats.org/drawingml/2006/main" xmlns:r="http://schemas.openxmlformats.org/officeDocument/2006/relationships" xmlns:p="http://schemas.openxmlformats.org/presentationml/2006/main">
+  <p:cSld>
+    <p:spTree>
+      <p:nvGrpSpPr>
+        <p:cNvPr id="1" name=""/>
+        <p:cNvGrpSpPr/>
+        <p:nvPr/>
+      </p:nvGrpSpPr>
+      <p:grpSpPr>
+        <a:xfrm>
+          <a:off x="0" y="0"/>
+          <a:ext cx="0" cy="0"/>
+          <a:chOff x="0" y="0"/>
+          <a:chExt cx="0" cy="0"/>
+        </a:xfrm>
+      </p:grpSpPr>
+      <p:sp>
+        <p:nvSpPr>
+          <p:cNvPr id="2" name="Title 1">
+            <a:extLst>
+              <a:ext uri="{FF2B5EF4-FFF2-40B4-BE49-F238E27FC236}">
+                <a16:creationId xmlns:a16="http://schemas.microsoft.com/office/drawing/2014/main" id="{D9583005-C011-42D2-B884-49F99766CACC}"/>
+              </a:ext>
+            </a:extLst>
+          </p:cNvPr>
+          <p:cNvSpPr>
+            <a:spLocks noGrp="1"/>
+          </p:cNvSpPr>
+          <p:nvPr>
+            <p:ph type="title"/>
+          </p:nvPr>
+        </p:nvSpPr>
+        <p:spPr/>
+        <p:txBody>
+          <a:bodyPr/>
+          <a:lstStyle/>
+          <a:p>
+            <a:r>
+              <a:rPr lang="en-US" dirty="0"/>
+              <a:t>Validation (Proof of stake)</a:t>
+            </a:r>
+          </a:p>
+        </p:txBody>
+      </p:sp>
+      <p:pic>
+        <p:nvPicPr>
+          <p:cNvPr id="5" name="Content Placeholder 4">
+            <a:extLst>
+              <a:ext uri="{FF2B5EF4-FFF2-40B4-BE49-F238E27FC236}">
+                <a16:creationId xmlns:a16="http://schemas.microsoft.com/office/drawing/2014/main" id="{3E35F8B3-592E-4BBA-AD61-F39A507899AC}"/>
+              </a:ext>
+            </a:extLst>
+          </p:cNvPr>
+          <p:cNvPicPr>
+            <a:picLocks noGrp="1" noChangeAspect="1"/>
+          </p:cNvPicPr>
+          <p:nvPr>
+            <p:ph sz="half" idx="1"/>
+          </p:nvPr>
+        </p:nvPicPr>
+        <p:blipFill>
+          <a:blip r:embed="rId2"/>
+          <a:stretch>
+            <a:fillRect/>
+          </a:stretch>
+        </p:blipFill>
+        <p:spPr>
+          <a:xfrm>
+            <a:off x="685800" y="2060731"/>
+            <a:ext cx="3657600" cy="4108138"/>
+          </a:xfrm>
+        </p:spPr>
+      </p:pic>
+      <p:sp>
+        <p:nvSpPr>
+          <p:cNvPr id="6" name="Content Placeholder 5">
+            <a:extLst>
+              <a:ext uri="{FF2B5EF4-FFF2-40B4-BE49-F238E27FC236}">
+                <a16:creationId xmlns:a16="http://schemas.microsoft.com/office/drawing/2014/main" id="{2DD21872-506E-4AAD-A88F-3111B0EEC62C}"/>
+              </a:ext>
+            </a:extLst>
+          </p:cNvPr>
+          <p:cNvSpPr>
+            <a:spLocks noGrp="1"/>
+          </p:cNvSpPr>
+          <p:nvPr>
+            <p:ph sz="half" idx="2"/>
+          </p:nvPr>
+        </p:nvSpPr>
+        <p:spPr/>
+        <p:txBody>
+          <a:bodyPr/>
+          <a:lstStyle/>
+          <a:p>
+            <a:r>
+              <a:rPr lang="en-US" dirty="0"/>
+              <a:t>Instead of requiring tons of guessing and large amounts of computational power, the new “forger” could be chosen by the network</a:t>
+            </a:r>
+          </a:p>
+          <a:p>
+            <a:r>
+              <a:rPr lang="en-US" dirty="0"/>
+              <a:t>This forger is chosen at random based on how much stake they have in the network</a:t>
+            </a:r>
+          </a:p>
+          <a:p>
+            <a:r>
+              <a:rPr lang="en-US" dirty="0"/>
+              <a:t>If any validator is found to have an invalid block, their “stake” is removed</a:t>
+            </a:r>
+          </a:p>
+        </p:txBody>
+      </p:sp>
+    </p:spTree>
+    <p:extLst>
+      <p:ext uri="{BB962C8B-B14F-4D97-AF65-F5344CB8AC3E}">
+        <p14:creationId xmlns:p14="http://schemas.microsoft.com/office/powerpoint/2010/main" val="3414540986"/>
+      </p:ext>
+    </p:extLst>
+  </p:cSld>
+  <p:clrMapOvr>
+    <a:masterClrMapping/>
+  </p:clrMapOvr>
+</p:sld>
+</file>
+
+<file path=ppt/slides/slide13.xml><?xml version="1.0" encoding="utf-8"?>
+<p:sld xmlns:a="http://schemas.openxmlformats.org/drawingml/2006/main" xmlns:r="http://schemas.openxmlformats.org/officeDocument/2006/relationships" xmlns:p="http://schemas.openxmlformats.org/presentationml/2006/main">
+  <p:cSld>
+    <p:spTree>
+      <p:nvGrpSpPr>
+        <p:cNvPr id="1" name=""/>
+        <p:cNvGrpSpPr/>
+        <p:nvPr/>
+      </p:nvGrpSpPr>
+      <p:grpSpPr>
+        <a:xfrm>
+          <a:off x="0" y="0"/>
+          <a:ext cx="0" cy="0"/>
+          <a:chOff x="0" y="0"/>
+          <a:chExt cx="0" cy="0"/>
+        </a:xfrm>
+      </p:grpSpPr>
+      <p:sp>
+        <p:nvSpPr>
+          <p:cNvPr id="2" name="Title 1">
+            <a:extLst>
+              <a:ext uri="{FF2B5EF4-FFF2-40B4-BE49-F238E27FC236}">
+                <a16:creationId xmlns:a16="http://schemas.microsoft.com/office/drawing/2014/main" id="{79B4BC99-6024-4EBA-958E-822A65CD85DC}"/>
+              </a:ext>
+            </a:extLst>
+          </p:cNvPr>
+          <p:cNvSpPr>
+            <a:spLocks noGrp="1"/>
+          </p:cNvSpPr>
+          <p:nvPr>
+            <p:ph type="title"/>
+          </p:nvPr>
+        </p:nvSpPr>
+        <p:spPr/>
+        <p:txBody>
+          <a:bodyPr/>
+          <a:lstStyle/>
+          <a:p>
+            <a:r>
+              <a:rPr lang="en-US" dirty="0"/>
+              <a:t>(POS) Pros and cons</a:t>
+            </a:r>
+          </a:p>
+        </p:txBody>
+      </p:sp>
+      <p:sp>
+        <p:nvSpPr>
+          <p:cNvPr id="3" name="Content Placeholder 2">
+            <a:extLst>
+              <a:ext uri="{FF2B5EF4-FFF2-40B4-BE49-F238E27FC236}">
+                <a16:creationId xmlns:a16="http://schemas.microsoft.com/office/drawing/2014/main" id="{334C4A5E-841C-4621-95C7-82B70742E4C9}"/>
+              </a:ext>
+            </a:extLst>
+          </p:cNvPr>
+          <p:cNvSpPr>
+            <a:spLocks noGrp="1"/>
+          </p:cNvSpPr>
+          <p:nvPr>
+            <p:ph idx="1"/>
+          </p:nvPr>
+        </p:nvSpPr>
+        <p:spPr/>
+        <p:txBody>
+          <a:bodyPr>
+            <a:normAutofit/>
+          </a:bodyPr>
+          <a:lstStyle/>
+          <a:p>
+            <a:r>
+              <a:rPr lang="en-US" sz="2800" dirty="0"/>
+              <a:t>The initial code must be bulletproof- since it will be the weakest point in the system</a:t>
+            </a:r>
+          </a:p>
+          <a:p>
+            <a:r>
+              <a:rPr lang="en-US" sz="2800" dirty="0"/>
+              <a:t>Massive energy savings- you would only need a running laptop to participate as a validator</a:t>
+            </a:r>
+          </a:p>
+          <a:p>
+            <a:r>
+              <a:rPr lang="en-US" sz="2800" dirty="0"/>
+              <a:t>More individuals would be encouraged to hold the currency, as staking it increases their take</a:t>
+            </a:r>
+          </a:p>
+          <a:p>
+            <a:r>
+              <a:rPr lang="en-US" sz="2800" dirty="0"/>
+              <a:t>Removes the insecurity issue of 51%</a:t>
+            </a:r>
+          </a:p>
+        </p:txBody>
+      </p:sp>
+    </p:spTree>
+    <p:extLst>
+      <p:ext uri="{BB962C8B-B14F-4D97-AF65-F5344CB8AC3E}">
+        <p14:creationId xmlns:p14="http://schemas.microsoft.com/office/powerpoint/2010/main" val="3901173553"/>
+      </p:ext>
+    </p:extLst>
+  </p:cSld>
+  <p:clrMapOvr>
+    <a:masterClrMapping/>
+  </p:clrMapOvr>
+</p:sld>
+</file>
+
+<file path=ppt/slides/slide14.xml><?xml version="1.0" encoding="utf-8"?>
+<p:sld xmlns:a="http://schemas.openxmlformats.org/drawingml/2006/main" xmlns:r="http://schemas.openxmlformats.org/officeDocument/2006/relationships" xmlns:p="http://schemas.openxmlformats.org/presentationml/2006/main">
+  <p:cSld>
+    <p:spTree>
+      <p:nvGrpSpPr>
+        <p:cNvPr id="1" name=""/>
+        <p:cNvGrpSpPr/>
+        <p:nvPr/>
+      </p:nvGrpSpPr>
+      <p:grpSpPr>
+        <a:xfrm>
+          <a:off x="0" y="0"/>
+          <a:ext cx="0" cy="0"/>
+          <a:chOff x="0" y="0"/>
+          <a:chExt cx="0" cy="0"/>
+        </a:xfrm>
+      </p:grpSpPr>
+      <p:sp>
+        <p:nvSpPr>
+          <p:cNvPr id="2" name="Title 1">
+            <a:extLst>
+              <a:ext uri="{FF2B5EF4-FFF2-40B4-BE49-F238E27FC236}">
+                <a16:creationId xmlns:a16="http://schemas.microsoft.com/office/drawing/2014/main" id="{BC882BE6-AE9B-42C2-917B-112512407E41}"/>
+              </a:ext>
+            </a:extLst>
+          </p:cNvPr>
+          <p:cNvSpPr>
+            <a:spLocks noGrp="1"/>
+          </p:cNvSpPr>
+          <p:nvPr>
+            <p:ph type="title"/>
+          </p:nvPr>
+        </p:nvSpPr>
+        <p:spPr/>
+        <p:txBody>
+          <a:bodyPr/>
+          <a:lstStyle/>
+          <a:p>
+            <a:r>
+              <a:rPr lang="en-US" dirty="0"/>
+              <a:t>Bitcoin</a:t>
+            </a:r>
+          </a:p>
+        </p:txBody>
+      </p:sp>
+      <p:pic>
+        <p:nvPicPr>
+          <p:cNvPr id="6" name="Content Placeholder 5">
+            <a:extLst>
+              <a:ext uri="{FF2B5EF4-FFF2-40B4-BE49-F238E27FC236}">
+                <a16:creationId xmlns:a16="http://schemas.microsoft.com/office/drawing/2014/main" id="{ADFA4A00-EEB1-4AF5-BDDB-3E993784557E}"/>
+              </a:ext>
+            </a:extLst>
+          </p:cNvPr>
+          <p:cNvPicPr>
+            <a:picLocks noGrp="1" noChangeAspect="1"/>
+          </p:cNvPicPr>
+          <p:nvPr>
+            <p:ph sz="half" idx="1"/>
+          </p:nvPr>
+        </p:nvPicPr>
+        <p:blipFill>
+          <a:blip r:embed="rId2"/>
+          <a:stretch>
+            <a:fillRect/>
+          </a:stretch>
+        </p:blipFill>
+        <p:spPr>
+          <a:xfrm>
+            <a:off x="178419" y="2464421"/>
+            <a:ext cx="4622181" cy="3081454"/>
+          </a:xfrm>
+        </p:spPr>
+      </p:pic>
+      <p:sp>
+        <p:nvSpPr>
+          <p:cNvPr id="7" name="Content Placeholder 6">
+            <a:extLst>
+              <a:ext uri="{FF2B5EF4-FFF2-40B4-BE49-F238E27FC236}">
+                <a16:creationId xmlns:a16="http://schemas.microsoft.com/office/drawing/2014/main" id="{D24D9598-B491-4370-8597-9FDEB0C6B151}"/>
+              </a:ext>
+            </a:extLst>
+          </p:cNvPr>
+          <p:cNvSpPr>
+            <a:spLocks noGrp="1"/>
+          </p:cNvSpPr>
+          <p:nvPr>
+            <p:ph sz="half" idx="2"/>
+          </p:nvPr>
+        </p:nvSpPr>
+        <p:spPr/>
+        <p:txBody>
+          <a:bodyPr/>
+          <a:lstStyle/>
+          <a:p>
+            <a:r>
+              <a:rPr lang="en-US" dirty="0"/>
+              <a:t>Widely known as the first “cryptocurrency” built on the blockchain and, at times, is considered synonymous</a:t>
+            </a:r>
+          </a:p>
+          <a:p>
+            <a:r>
+              <a:rPr lang="en-US" dirty="0"/>
+              <a:t>Meant to be just that- a currency and not much more</a:t>
+            </a:r>
+          </a:p>
+          <a:p>
+            <a:r>
+              <a:rPr lang="en-US" dirty="0"/>
+              <a:t>Changes to the currency are very difficult (</a:t>
+            </a:r>
+            <a:r>
+              <a:rPr lang="en-US" dirty="0" err="1"/>
+              <a:t>e.g</a:t>
+            </a:r>
+            <a:r>
+              <a:rPr lang="en-US" dirty="0"/>
+              <a:t> Bitcoin Cash)</a:t>
+            </a:r>
+          </a:p>
+          <a:p>
+            <a:endParaRPr lang="en-US" dirty="0"/>
+          </a:p>
+        </p:txBody>
+      </p:sp>
+      <p:pic>
+        <p:nvPicPr>
+          <p:cNvPr id="4" name="Picture 3">
+            <a:extLst>
+              <a:ext uri="{FF2B5EF4-FFF2-40B4-BE49-F238E27FC236}">
+                <a16:creationId xmlns:a16="http://schemas.microsoft.com/office/drawing/2014/main" id="{2B0F4FD7-EBD8-4750-82EE-187E594CD66D}"/>
+              </a:ext>
+            </a:extLst>
+          </p:cNvPr>
+          <p:cNvPicPr>
+            <a:picLocks noChangeAspect="1"/>
+          </p:cNvPicPr>
+          <p:nvPr/>
+        </p:nvPicPr>
+        <p:blipFill>
+          <a:blip r:embed="rId3"/>
+          <a:stretch>
+            <a:fillRect/>
+          </a:stretch>
+        </p:blipFill>
+        <p:spPr>
+          <a:xfrm>
+            <a:off x="6291374" y="0"/>
+            <a:ext cx="1895707" cy="1895707"/>
+          </a:xfrm>
+          <a:prstGeom prst="rect">
+            <a:avLst/>
+          </a:prstGeom>
+        </p:spPr>
+      </p:pic>
+    </p:spTree>
+    <p:extLst>
+      <p:ext uri="{BB962C8B-B14F-4D97-AF65-F5344CB8AC3E}">
+        <p14:creationId xmlns:p14="http://schemas.microsoft.com/office/powerpoint/2010/main" val="2410926227"/>
+      </p:ext>
+    </p:extLst>
+  </p:cSld>
+  <p:clrMapOvr>
+    <a:masterClrMapping/>
+  </p:clrMapOvr>
+</p:sld>
+</file>
+
+<file path=ppt/slides/slide15.xml><?xml version="1.0" encoding="utf-8"?>
+<p:sld xmlns:a="http://schemas.openxmlformats.org/drawingml/2006/main" xmlns:r="http://schemas.openxmlformats.org/officeDocument/2006/relationships" xmlns:p="http://schemas.openxmlformats.org/presentationml/2006/main">
+  <p:cSld>
+    <p:spTree>
+      <p:nvGrpSpPr>
+        <p:cNvPr id="1" name=""/>
+        <p:cNvGrpSpPr/>
+        <p:nvPr/>
+      </p:nvGrpSpPr>
+      <p:grpSpPr>
+        <a:xfrm>
+          <a:off x="0" y="0"/>
+          <a:ext cx="0" cy="0"/>
+          <a:chOff x="0" y="0"/>
+          <a:chExt cx="0" cy="0"/>
+        </a:xfrm>
+      </p:grpSpPr>
+      <p:sp>
+        <p:nvSpPr>
+          <p:cNvPr id="2" name="Title 1">
+            <a:extLst>
+              <a:ext uri="{FF2B5EF4-FFF2-40B4-BE49-F238E27FC236}">
+                <a16:creationId xmlns:a16="http://schemas.microsoft.com/office/drawing/2014/main" id="{EA14524D-82CB-498D-90D9-6D3452BD4885}"/>
+              </a:ext>
+            </a:extLst>
+          </p:cNvPr>
+          <p:cNvSpPr>
+            <a:spLocks noGrp="1"/>
+          </p:cNvSpPr>
+          <p:nvPr>
+            <p:ph type="title"/>
+          </p:nvPr>
+        </p:nvSpPr>
+        <p:spPr/>
+        <p:txBody>
+          <a:bodyPr/>
+          <a:lstStyle/>
+          <a:p>
+            <a:r>
+              <a:rPr lang="en-US" dirty="0"/>
+              <a:t>Ripple</a:t>
+            </a:r>
+          </a:p>
+        </p:txBody>
+      </p:sp>
+      <p:sp>
+        <p:nvSpPr>
+          <p:cNvPr id="3" name="Content Placeholder 2">
+            <a:extLst>
+              <a:ext uri="{FF2B5EF4-FFF2-40B4-BE49-F238E27FC236}">
+                <a16:creationId xmlns:a16="http://schemas.microsoft.com/office/drawing/2014/main" id="{CC2B6D5D-CB13-428E-9A9B-4333C63D5CC5}"/>
+              </a:ext>
+            </a:extLst>
+          </p:cNvPr>
+          <p:cNvSpPr>
+            <a:spLocks noGrp="1"/>
+          </p:cNvSpPr>
+          <p:nvPr>
+            <p:ph idx="1"/>
+          </p:nvPr>
+        </p:nvSpPr>
+        <p:spPr/>
+        <p:txBody>
+          <a:bodyPr/>
+          <a:lstStyle/>
+          <a:p>
+            <a:r>
+              <a:rPr lang="en-US" dirty="0"/>
+              <a:t>Growing in popularity</a:t>
+            </a:r>
+          </a:p>
+          <a:p>
+            <a:r>
+              <a:rPr lang="en-US" dirty="0"/>
+              <a:t>Very fast transaction times</a:t>
+            </a:r>
+          </a:p>
+          <a:p>
+            <a:r>
+              <a:rPr lang="en-US" dirty="0"/>
+              <a:t>Primary purpose is to save transaction time and costs between banks</a:t>
+            </a:r>
+          </a:p>
+          <a:p>
+            <a:r>
+              <a:rPr lang="en-US" dirty="0"/>
+              <a:t>Great for international transfers</a:t>
+            </a:r>
+          </a:p>
+        </p:txBody>
+      </p:sp>
+      <p:pic>
+        <p:nvPicPr>
+          <p:cNvPr id="4" name="Picture 3">
+            <a:extLst>
+              <a:ext uri="{FF2B5EF4-FFF2-40B4-BE49-F238E27FC236}">
+                <a16:creationId xmlns:a16="http://schemas.microsoft.com/office/drawing/2014/main" id="{65B608DD-0FDC-4C04-9A46-155A3B5B7C97}"/>
+              </a:ext>
+            </a:extLst>
+          </p:cNvPr>
+          <p:cNvPicPr>
+            <a:picLocks noChangeAspect="1"/>
+          </p:cNvPicPr>
+          <p:nvPr/>
+        </p:nvPicPr>
+        <p:blipFill>
+          <a:blip r:embed="rId2"/>
+          <a:stretch>
+            <a:fillRect/>
+          </a:stretch>
+        </p:blipFill>
+        <p:spPr>
+          <a:xfrm>
+            <a:off x="6346076" y="0"/>
+            <a:ext cx="2111343" cy="2111343"/>
+          </a:xfrm>
+          <a:prstGeom prst="rect">
+            <a:avLst/>
+          </a:prstGeom>
+        </p:spPr>
+      </p:pic>
+      <p:pic>
+        <p:nvPicPr>
+          <p:cNvPr id="6" name="Picture 5">
+            <a:extLst>
+              <a:ext uri="{FF2B5EF4-FFF2-40B4-BE49-F238E27FC236}">
+                <a16:creationId xmlns:a16="http://schemas.microsoft.com/office/drawing/2014/main" id="{28D2FFB5-09CB-48E9-9380-265C393B845B}"/>
+              </a:ext>
+            </a:extLst>
+          </p:cNvPr>
+          <p:cNvPicPr>
+            <a:picLocks noChangeAspect="1"/>
+          </p:cNvPicPr>
+          <p:nvPr/>
+        </p:nvPicPr>
+        <p:blipFill>
+          <a:blip r:embed="rId3"/>
+          <a:stretch>
+            <a:fillRect/>
+          </a:stretch>
+        </p:blipFill>
+        <p:spPr>
+          <a:xfrm>
+            <a:off x="4360128" y="4271667"/>
+            <a:ext cx="4097292" cy="2302157"/>
+          </a:xfrm>
+          <a:prstGeom prst="rect">
+            <a:avLst/>
+          </a:prstGeom>
+        </p:spPr>
+      </p:pic>
+    </p:spTree>
+    <p:extLst>
+      <p:ext uri="{BB962C8B-B14F-4D97-AF65-F5344CB8AC3E}">
+        <p14:creationId xmlns:p14="http://schemas.microsoft.com/office/powerpoint/2010/main" val="4132384512"/>
+      </p:ext>
+    </p:extLst>
+  </p:cSld>
+  <p:clrMapOvr>
+    <a:masterClrMapping/>
+  </p:clrMapOvr>
+</p:sld>
+</file>
+
+<file path=ppt/slides/slide16.xml><?xml version="1.0" encoding="utf-8"?>
+<p:sld xmlns:a="http://schemas.openxmlformats.org/drawingml/2006/main" xmlns:r="http://schemas.openxmlformats.org/officeDocument/2006/relationships" xmlns:p="http://schemas.openxmlformats.org/presentationml/2006/main">
+  <p:cSld>
+    <p:spTree>
+      <p:nvGrpSpPr>
+        <p:cNvPr id="1" name=""/>
+        <p:cNvGrpSpPr/>
+        <p:nvPr/>
+      </p:nvGrpSpPr>
+      <p:grpSpPr>
+        <a:xfrm>
+          <a:off x="0" y="0"/>
+          <a:ext cx="0" cy="0"/>
+          <a:chOff x="0" y="0"/>
+          <a:chExt cx="0" cy="0"/>
+        </a:xfrm>
+      </p:grpSpPr>
+      <p:sp>
+        <p:nvSpPr>
+          <p:cNvPr id="2" name="Title 1">
+            <a:extLst>
+              <a:ext uri="{FF2B5EF4-FFF2-40B4-BE49-F238E27FC236}">
+                <a16:creationId xmlns:a16="http://schemas.microsoft.com/office/drawing/2014/main" id="{B6468C84-4B38-4566-AC6A-56D223DA261B}"/>
+              </a:ext>
+            </a:extLst>
+          </p:cNvPr>
+          <p:cNvSpPr>
+            <a:spLocks noGrp="1"/>
+          </p:cNvSpPr>
+          <p:nvPr>
+            <p:ph type="title"/>
+          </p:nvPr>
+        </p:nvSpPr>
+        <p:spPr/>
+        <p:txBody>
+          <a:bodyPr/>
+          <a:lstStyle/>
+          <a:p>
+            <a:r>
+              <a:rPr lang="en-US" dirty="0"/>
+              <a:t>Ethereum</a:t>
+            </a:r>
+          </a:p>
+        </p:txBody>
+      </p:sp>
+      <p:sp>
+        <p:nvSpPr>
+          <p:cNvPr id="3" name="Content Placeholder 2">
+            <a:extLst>
+              <a:ext uri="{FF2B5EF4-FFF2-40B4-BE49-F238E27FC236}">
+                <a16:creationId xmlns:a16="http://schemas.microsoft.com/office/drawing/2014/main" id="{61A7B1B7-AE55-4EF5-AAC6-06D498ED781B}"/>
+              </a:ext>
+            </a:extLst>
+          </p:cNvPr>
+          <p:cNvSpPr>
+            <a:spLocks noGrp="1"/>
+          </p:cNvSpPr>
+          <p:nvPr>
+            <p:ph sz="half" idx="1"/>
+          </p:nvPr>
+        </p:nvSpPr>
+        <p:spPr>
+          <a:xfrm>
+            <a:off x="685797" y="2011680"/>
+            <a:ext cx="3518213" cy="4206240"/>
+          </a:xfrm>
+        </p:spPr>
+        <p:txBody>
+          <a:bodyPr/>
+          <a:lstStyle/>
+          <a:p>
+            <a:r>
+              <a:rPr lang="en-US" dirty="0"/>
+              <a:t>My personal favorite – probably the most popular currency with the most utility</a:t>
+            </a:r>
+          </a:p>
+          <a:p>
+            <a:r>
+              <a:rPr lang="en-US" dirty="0"/>
+              <a:t>A Turing Complete programming language</a:t>
+            </a:r>
+          </a:p>
+          <a:p>
+            <a:r>
+              <a:rPr lang="en-US" dirty="0"/>
+              <a:t>Every address has the ability to run code on it – or smart contracts</a:t>
+            </a:r>
+          </a:p>
+        </p:txBody>
+      </p:sp>
+      <p:pic>
+        <p:nvPicPr>
+          <p:cNvPr id="7" name="Content Placeholder 6">
+            <a:extLst>
+              <a:ext uri="{FF2B5EF4-FFF2-40B4-BE49-F238E27FC236}">
+                <a16:creationId xmlns:a16="http://schemas.microsoft.com/office/drawing/2014/main" id="{D3E84B43-CBB9-44D5-8920-CD6A4B3323BE}"/>
+              </a:ext>
+            </a:extLst>
+          </p:cNvPr>
+          <p:cNvPicPr>
+            <a:picLocks noGrp="1" noChangeAspect="1"/>
+          </p:cNvPicPr>
+          <p:nvPr>
+            <p:ph sz="half" idx="2"/>
+          </p:nvPr>
+        </p:nvPicPr>
+        <p:blipFill>
+          <a:blip r:embed="rId2"/>
+          <a:stretch>
+            <a:fillRect/>
+          </a:stretch>
+        </p:blipFill>
+        <p:spPr>
+          <a:xfrm>
+            <a:off x="4204010" y="2626931"/>
+            <a:ext cx="2360541" cy="3139081"/>
+          </a:xfrm>
+        </p:spPr>
+      </p:pic>
+      <p:pic>
+        <p:nvPicPr>
+          <p:cNvPr id="4" name="Picture 3">
+            <a:extLst>
+              <a:ext uri="{FF2B5EF4-FFF2-40B4-BE49-F238E27FC236}">
+                <a16:creationId xmlns:a16="http://schemas.microsoft.com/office/drawing/2014/main" id="{0E96D193-8DCF-40EE-B0F1-282B371C571C}"/>
+              </a:ext>
+            </a:extLst>
+          </p:cNvPr>
+          <p:cNvPicPr>
+            <a:picLocks noChangeAspect="1"/>
+          </p:cNvPicPr>
+          <p:nvPr/>
+        </p:nvPicPr>
+        <p:blipFill>
+          <a:blip r:embed="rId3"/>
+          <a:stretch>
+            <a:fillRect/>
+          </a:stretch>
+        </p:blipFill>
+        <p:spPr>
+          <a:xfrm>
+            <a:off x="6650120" y="0"/>
+            <a:ext cx="2376209" cy="2376209"/>
+          </a:xfrm>
+          <a:prstGeom prst="rect">
+            <a:avLst/>
+          </a:prstGeom>
+        </p:spPr>
+      </p:pic>
+      <p:pic>
+        <p:nvPicPr>
+          <p:cNvPr id="9" name="Picture 8">
+            <a:extLst>
+              <a:ext uri="{FF2B5EF4-FFF2-40B4-BE49-F238E27FC236}">
+                <a16:creationId xmlns:a16="http://schemas.microsoft.com/office/drawing/2014/main" id="{8730D47A-1E5A-4A4D-B7D6-94E70F906182}"/>
+              </a:ext>
+            </a:extLst>
+          </p:cNvPr>
+          <p:cNvPicPr>
+            <a:picLocks noChangeAspect="1"/>
+          </p:cNvPicPr>
+          <p:nvPr/>
+        </p:nvPicPr>
+        <p:blipFill>
+          <a:blip r:embed="rId4"/>
+          <a:stretch>
+            <a:fillRect/>
+          </a:stretch>
+        </p:blipFill>
+        <p:spPr>
+          <a:xfrm>
+            <a:off x="6564551" y="2626931"/>
+            <a:ext cx="2308940" cy="3139081"/>
+          </a:xfrm>
+          <a:prstGeom prst="rect">
+            <a:avLst/>
+          </a:prstGeom>
+        </p:spPr>
+      </p:pic>
+    </p:spTree>
+    <p:extLst>
+      <p:ext uri="{BB962C8B-B14F-4D97-AF65-F5344CB8AC3E}">
+        <p14:creationId xmlns:p14="http://schemas.microsoft.com/office/powerpoint/2010/main" val="2194881583"/>
+      </p:ext>
+    </p:extLst>
+  </p:cSld>
+  <p:clrMapOvr>
+    <a:masterClrMapping/>
+  </p:clrMapOvr>
+</p:sld>
+</file>
+
+<file path=ppt/slides/slide17.xml><?xml version="1.0" encoding="utf-8"?>
+<p:sld xmlns:a="http://schemas.openxmlformats.org/drawingml/2006/main" xmlns:r="http://schemas.openxmlformats.org/officeDocument/2006/relationships" xmlns:p="http://schemas.openxmlformats.org/presentationml/2006/main">
+  <p:cSld>
+    <p:spTree>
+      <p:nvGrpSpPr>
+        <p:cNvPr id="1" name=""/>
+        <p:cNvGrpSpPr/>
+        <p:nvPr/>
+      </p:nvGrpSpPr>
+      <p:grpSpPr>
+        <a:xfrm>
+          <a:off x="0" y="0"/>
+          <a:ext cx="0" cy="0"/>
+          <a:chOff x="0" y="0"/>
+          <a:chExt cx="0" cy="0"/>
+        </a:xfrm>
+      </p:grpSpPr>
+      <p:sp>
+        <p:nvSpPr>
+          <p:cNvPr id="2" name="Title 1">
+            <a:extLst>
+              <a:ext uri="{FF2B5EF4-FFF2-40B4-BE49-F238E27FC236}">
+                <a16:creationId xmlns:a16="http://schemas.microsoft.com/office/drawing/2014/main" id="{DE3F6379-67EA-4676-8F0F-38D52380DB16}"/>
+              </a:ext>
+            </a:extLst>
+          </p:cNvPr>
+          <p:cNvSpPr>
+            <a:spLocks noGrp="1"/>
+          </p:cNvSpPr>
+          <p:nvPr>
+            <p:ph type="title"/>
+          </p:nvPr>
+        </p:nvSpPr>
+        <p:spPr/>
+        <p:txBody>
+          <a:bodyPr/>
+          <a:lstStyle/>
+          <a:p>
+            <a:r>
+              <a:rPr lang="en-US" dirty="0"/>
+              <a:t>Ethereum and it’s advances</a:t>
+            </a:r>
+          </a:p>
+        </p:txBody>
+      </p:sp>
+      <p:sp>
+        <p:nvSpPr>
+          <p:cNvPr id="3" name="Content Placeholder 2">
+            <a:extLst>
+              <a:ext uri="{FF2B5EF4-FFF2-40B4-BE49-F238E27FC236}">
+                <a16:creationId xmlns:a16="http://schemas.microsoft.com/office/drawing/2014/main" id="{5E3D96B4-E206-44F8-B222-391AD90F8C93}"/>
+              </a:ext>
+            </a:extLst>
+          </p:cNvPr>
+          <p:cNvSpPr>
+            <a:spLocks noGrp="1"/>
+          </p:cNvSpPr>
+          <p:nvPr>
+            <p:ph idx="1"/>
+          </p:nvPr>
+        </p:nvSpPr>
+        <p:spPr/>
+        <p:txBody>
+          <a:bodyPr/>
+          <a:lstStyle/>
+          <a:p>
+            <a:r>
+              <a:rPr lang="en-US" sz="2800" dirty="0" err="1"/>
+              <a:t>ÐApps</a:t>
+            </a:r>
+            <a:r>
+              <a:rPr lang="en-US" sz="2800" dirty="0"/>
+              <a:t>  (</a:t>
+            </a:r>
+            <a:r>
+              <a:rPr lang="en-US" sz="2800" dirty="0">
+                <a:hlinkClick r:id="rId2"/>
+              </a:rPr>
+              <a:t>https://www.stateofthedapps.com/</a:t>
+            </a:r>
+            <a:r>
+              <a:rPr lang="en-US" sz="2800" dirty="0"/>
+              <a:t>)</a:t>
+            </a:r>
+          </a:p>
+          <a:p>
+            <a:r>
+              <a:rPr lang="en-US" sz="2800" dirty="0"/>
+              <a:t>Smart Contracts</a:t>
+            </a:r>
+          </a:p>
+          <a:p>
+            <a:r>
+              <a:rPr lang="en-US" sz="2800" dirty="0"/>
+              <a:t>A dedicated team to work on the network (Could be considered centralized)</a:t>
+            </a:r>
+          </a:p>
+          <a:p>
+            <a:r>
+              <a:rPr lang="en-US" sz="2800" dirty="0"/>
+              <a:t>Casper (Proof of Stake)</a:t>
+            </a:r>
+          </a:p>
+          <a:p>
+            <a:r>
+              <a:rPr lang="en-US" sz="2800" dirty="0"/>
+              <a:t>Swarm</a:t>
+            </a:r>
+          </a:p>
+          <a:p>
+            <a:r>
+              <a:rPr lang="en-US" sz="2800" dirty="0" err="1"/>
+              <a:t>Sharding</a:t>
+            </a:r>
+            <a:r>
+              <a:rPr lang="en-US" sz="2800" dirty="0"/>
+              <a:t>/Plasma</a:t>
+            </a:r>
+          </a:p>
+          <a:p>
+            <a:endParaRPr lang="en-US" dirty="0"/>
+          </a:p>
+          <a:p>
+            <a:endParaRPr lang="en-US" dirty="0"/>
+          </a:p>
+        </p:txBody>
+      </p:sp>
+      <p:pic>
+        <p:nvPicPr>
+          <p:cNvPr id="4" name="Picture 3">
+            <a:extLst>
+              <a:ext uri="{FF2B5EF4-FFF2-40B4-BE49-F238E27FC236}">
+                <a16:creationId xmlns:a16="http://schemas.microsoft.com/office/drawing/2014/main" id="{A0AC0FCD-81B5-4D76-B846-36FE63A45E11}"/>
+              </a:ext>
+            </a:extLst>
+          </p:cNvPr>
+          <p:cNvPicPr>
+            <a:picLocks noChangeAspect="1"/>
+          </p:cNvPicPr>
+          <p:nvPr/>
+        </p:nvPicPr>
+        <p:blipFill>
+          <a:blip r:embed="rId3"/>
+          <a:stretch>
+            <a:fillRect/>
+          </a:stretch>
+        </p:blipFill>
+        <p:spPr>
+          <a:xfrm>
+            <a:off x="7635240" y="284176"/>
+            <a:ext cx="1508760" cy="1508760"/>
+          </a:xfrm>
+          <a:prstGeom prst="rect">
+            <a:avLst/>
+          </a:prstGeom>
+        </p:spPr>
+      </p:pic>
+      <p:pic>
+        <p:nvPicPr>
+          <p:cNvPr id="6" name="Picture 5">
+            <a:extLst>
+              <a:ext uri="{FF2B5EF4-FFF2-40B4-BE49-F238E27FC236}">
+                <a16:creationId xmlns:a16="http://schemas.microsoft.com/office/drawing/2014/main" id="{70834B86-867B-4F71-BA05-4DE55995F309}"/>
+              </a:ext>
+            </a:extLst>
+          </p:cNvPr>
+          <p:cNvPicPr>
+            <a:picLocks noChangeAspect="1"/>
+          </p:cNvPicPr>
+          <p:nvPr/>
+        </p:nvPicPr>
+        <p:blipFill>
+          <a:blip r:embed="rId4"/>
+          <a:stretch>
+            <a:fillRect/>
+          </a:stretch>
+        </p:blipFill>
+        <p:spPr>
+          <a:xfrm>
+            <a:off x="4571219" y="4114801"/>
+            <a:ext cx="4222073" cy="2103120"/>
+          </a:xfrm>
+          <a:prstGeom prst="rect">
+            <a:avLst/>
+          </a:prstGeom>
+        </p:spPr>
+      </p:pic>
+    </p:spTree>
+    <p:extLst>
+      <p:ext uri="{BB962C8B-B14F-4D97-AF65-F5344CB8AC3E}">
+        <p14:creationId xmlns:p14="http://schemas.microsoft.com/office/powerpoint/2010/main" val="2479250040"/>
+      </p:ext>
+    </p:extLst>
+  </p:cSld>
+  <p:clrMapOvr>
+    <a:masterClrMapping/>
+  </p:clrMapOvr>
+</p:sld>
+</file>
+
+<file path=ppt/slides/slide18.xml><?xml version="1.0" encoding="utf-8"?>
+<p:sld xmlns:a="http://schemas.openxmlformats.org/drawingml/2006/main" xmlns:r="http://schemas.openxmlformats.org/officeDocument/2006/relationships" xmlns:p="http://schemas.openxmlformats.org/presentationml/2006/main">
+  <p:cSld>
+    <p:spTree>
+      <p:nvGrpSpPr>
+        <p:cNvPr id="1" name=""/>
+        <p:cNvGrpSpPr/>
+        <p:nvPr/>
+      </p:nvGrpSpPr>
+      <p:grpSpPr>
+        <a:xfrm>
+          <a:off x="0" y="0"/>
+          <a:ext cx="0" cy="0"/>
+          <a:chOff x="0" y="0"/>
+          <a:chExt cx="0" cy="0"/>
+        </a:xfrm>
+      </p:grpSpPr>
+      <p:sp>
+        <p:nvSpPr>
+          <p:cNvPr id="2" name="Title 1">
+            <a:extLst>
+              <a:ext uri="{FF2B5EF4-FFF2-40B4-BE49-F238E27FC236}">
+                <a16:creationId xmlns:a16="http://schemas.microsoft.com/office/drawing/2014/main" id="{5A4F4C9E-B1BB-42AA-8D42-B75268C08E90}"/>
+              </a:ext>
+            </a:extLst>
+          </p:cNvPr>
+          <p:cNvSpPr>
+            <a:spLocks noGrp="1"/>
+          </p:cNvSpPr>
+          <p:nvPr>
+            <p:ph type="title"/>
+          </p:nvPr>
+        </p:nvSpPr>
+        <p:spPr/>
+        <p:txBody>
+          <a:bodyPr/>
+          <a:lstStyle/>
+          <a:p>
+            <a:r>
+              <a:rPr lang="en-US" dirty="0"/>
+              <a:t>Issues facing blockchain today</a:t>
+            </a:r>
+          </a:p>
+        </p:txBody>
+      </p:sp>
+      <p:sp>
+        <p:nvSpPr>
+          <p:cNvPr id="3" name="Content Placeholder 2">
+            <a:extLst>
+              <a:ext uri="{FF2B5EF4-FFF2-40B4-BE49-F238E27FC236}">
+                <a16:creationId xmlns:a16="http://schemas.microsoft.com/office/drawing/2014/main" id="{0B6AD110-E159-4030-A78E-CCAC5E443751}"/>
+              </a:ext>
+            </a:extLst>
+          </p:cNvPr>
+          <p:cNvSpPr>
+            <a:spLocks noGrp="1"/>
+          </p:cNvSpPr>
+          <p:nvPr>
+            <p:ph idx="1"/>
+          </p:nvPr>
+        </p:nvSpPr>
+        <p:spPr/>
+        <p:txBody>
+          <a:bodyPr>
+            <a:normAutofit/>
+          </a:bodyPr>
+          <a:lstStyle/>
+          <a:p>
+            <a:r>
+              <a:rPr lang="en-US" sz="3600" dirty="0"/>
+              <a:t>Illegal use</a:t>
+            </a:r>
+          </a:p>
+          <a:p>
+            <a:r>
+              <a:rPr lang="en-US" sz="3600" dirty="0"/>
+              <a:t>Scalability</a:t>
+            </a:r>
+          </a:p>
+          <a:p>
+            <a:r>
+              <a:rPr lang="en-US" sz="3600" dirty="0"/>
+              <a:t>Mass adoption</a:t>
+            </a:r>
+          </a:p>
+          <a:p>
+            <a:r>
+              <a:rPr lang="en-US" sz="3600" dirty="0"/>
+              <a:t>Privacy</a:t>
+            </a:r>
+          </a:p>
+        </p:txBody>
+      </p:sp>
+      <p:pic>
+        <p:nvPicPr>
+          <p:cNvPr id="5" name="Picture 4">
+            <a:extLst>
+              <a:ext uri="{FF2B5EF4-FFF2-40B4-BE49-F238E27FC236}">
+                <a16:creationId xmlns:a16="http://schemas.microsoft.com/office/drawing/2014/main" id="{7B9FC4C9-7A12-4623-83D3-0C1B7EE4F65B}"/>
+              </a:ext>
+            </a:extLst>
+          </p:cNvPr>
+          <p:cNvPicPr>
+            <a:picLocks noChangeAspect="1"/>
+          </p:cNvPicPr>
+          <p:nvPr/>
+        </p:nvPicPr>
+        <p:blipFill>
+          <a:blip r:embed="rId2"/>
+          <a:stretch>
+            <a:fillRect/>
+          </a:stretch>
+        </p:blipFill>
+        <p:spPr>
+          <a:xfrm>
+            <a:off x="4170555" y="2170011"/>
+            <a:ext cx="4680957" cy="3116363"/>
+          </a:xfrm>
+          <a:prstGeom prst="rect">
+            <a:avLst/>
+          </a:prstGeom>
+        </p:spPr>
+      </p:pic>
+    </p:spTree>
+    <p:extLst>
+      <p:ext uri="{BB962C8B-B14F-4D97-AF65-F5344CB8AC3E}">
+        <p14:creationId xmlns:p14="http://schemas.microsoft.com/office/powerpoint/2010/main" val="960538671"/>
+      </p:ext>
+    </p:extLst>
+  </p:cSld>
+  <p:clrMapOvr>
+    <a:masterClrMapping/>
+  </p:clrMapOvr>
+</p:sld>
+</file>
+
+<file path=ppt/slides/slide19.xml><?xml version="1.0" encoding="utf-8"?>
+<p:sld xmlns:a="http://schemas.openxmlformats.org/drawingml/2006/main" xmlns:r="http://schemas.openxmlformats.org/officeDocument/2006/relationships" xmlns:p="http://schemas.openxmlformats.org/presentationml/2006/main">
+  <p:cSld>
+    <p:spTree>
+      <p:nvGrpSpPr>
+        <p:cNvPr id="1" name=""/>
+        <p:cNvGrpSpPr/>
+        <p:nvPr/>
+      </p:nvGrpSpPr>
+      <p:grpSpPr>
+        <a:xfrm>
+          <a:off x="0" y="0"/>
+          <a:ext cx="0" cy="0"/>
+          <a:chOff x="0" y="0"/>
+          <a:chExt cx="0" cy="0"/>
+        </a:xfrm>
+      </p:grpSpPr>
+      <p:sp>
+        <p:nvSpPr>
+          <p:cNvPr id="2" name="Title 1">
+            <a:extLst>
+              <a:ext uri="{FF2B5EF4-FFF2-40B4-BE49-F238E27FC236}">
+                <a16:creationId xmlns:a16="http://schemas.microsoft.com/office/drawing/2014/main" id="{53EA5AD8-CF2D-499A-94E1-95C6B51269A3}"/>
+              </a:ext>
+            </a:extLst>
+          </p:cNvPr>
+          <p:cNvSpPr>
+            <a:spLocks noGrp="1"/>
+          </p:cNvSpPr>
+          <p:nvPr>
+            <p:ph type="title"/>
+          </p:nvPr>
+        </p:nvSpPr>
+        <p:spPr/>
+        <p:txBody>
+          <a:bodyPr/>
+          <a:lstStyle/>
+          <a:p>
+            <a:r>
+              <a:rPr lang="en-US" dirty="0"/>
+              <a:t>So why does it matter?</a:t>
+            </a:r>
+          </a:p>
+        </p:txBody>
+      </p:sp>
+      <p:sp>
+        <p:nvSpPr>
+          <p:cNvPr id="3" name="Content Placeholder 2">
+            <a:extLst>
+              <a:ext uri="{FF2B5EF4-FFF2-40B4-BE49-F238E27FC236}">
+                <a16:creationId xmlns:a16="http://schemas.microsoft.com/office/drawing/2014/main" id="{2CCB1798-E388-49BF-AC95-309907CAB855}"/>
+              </a:ext>
+            </a:extLst>
+          </p:cNvPr>
+          <p:cNvSpPr>
+            <a:spLocks noGrp="1"/>
+          </p:cNvSpPr>
+          <p:nvPr>
+            <p:ph idx="1"/>
+          </p:nvPr>
+        </p:nvSpPr>
+        <p:spPr/>
+        <p:txBody>
+          <a:bodyPr>
+            <a:normAutofit/>
+          </a:bodyPr>
+          <a:lstStyle/>
+          <a:p>
+            <a:r>
+              <a:rPr lang="en-US" sz="2800" dirty="0"/>
+              <a:t>The potential is astronomical, assuming key issues are resolved.</a:t>
+            </a:r>
+          </a:p>
+          <a:p>
+            <a:r>
+              <a:rPr lang="en-US" sz="2800" dirty="0"/>
+              <a:t>Can culturally and economically change the world financial system</a:t>
+            </a:r>
+          </a:p>
+          <a:p>
+            <a:r>
+              <a:rPr lang="en-US" sz="2800" dirty="0"/>
+              <a:t>Has helped to stabilize some third-world country economies (somewhat)</a:t>
+            </a:r>
+          </a:p>
+          <a:p>
+            <a:r>
+              <a:rPr lang="en-US" sz="2800" dirty="0"/>
+              <a:t>Could potentially eliminate the need for locally hosted servers and massive, insecure, controlled databases</a:t>
+            </a:r>
+          </a:p>
+        </p:txBody>
+      </p:sp>
+    </p:spTree>
+    <p:extLst>
+      <p:ext uri="{BB962C8B-B14F-4D97-AF65-F5344CB8AC3E}">
+        <p14:creationId xmlns:p14="http://schemas.microsoft.com/office/powerpoint/2010/main" val="2261400168"/>
+      </p:ext>
+    </p:extLst>
+  </p:cSld>
+  <p:clrMapOvr>
+    <a:masterClrMapping/>
+  </p:clrMapOvr>
+</p:sld>
+</file>
+
 <file path=ppt/slides/slide2.xml><?xml version="1.0" encoding="utf-8"?>
 <p:sld xmlns:a="http://schemas.openxmlformats.org/drawingml/2006/main" xmlns:r="http://schemas.openxmlformats.org/officeDocument/2006/relationships" xmlns:p="http://schemas.openxmlformats.org/presentationml/2006/main">
   <p:cSld>
@@ -3891,10 +5846,308 @@
           </a:p>
         </p:txBody>
       </p:sp>
+      <p:pic>
+        <p:nvPicPr>
+          <p:cNvPr id="3" name="Picture 2">
+            <a:extLst>
+              <a:ext uri="{FF2B5EF4-FFF2-40B4-BE49-F238E27FC236}">
+                <a16:creationId xmlns:a16="http://schemas.microsoft.com/office/drawing/2014/main" id="{5618378F-250C-4B50-B697-15FEAEA3A698}"/>
+              </a:ext>
+            </a:extLst>
+          </p:cNvPr>
+          <p:cNvPicPr>
+            <a:picLocks noChangeAspect="1"/>
+          </p:cNvPicPr>
+          <p:nvPr/>
+        </p:nvPicPr>
+        <p:blipFill>
+          <a:blip r:embed="rId3"/>
+          <a:stretch>
+            <a:fillRect/>
+          </a:stretch>
+        </p:blipFill>
+        <p:spPr>
+          <a:xfrm>
+            <a:off x="5547148" y="4051168"/>
+            <a:ext cx="2701305" cy="2701305"/>
+          </a:xfrm>
+          <a:prstGeom prst="rect">
+            <a:avLst/>
+          </a:prstGeom>
+        </p:spPr>
+      </p:pic>
+      <p:pic>
+        <p:nvPicPr>
+          <p:cNvPr id="6" name="Picture 5">
+            <a:extLst>
+              <a:ext uri="{FF2B5EF4-FFF2-40B4-BE49-F238E27FC236}">
+                <a16:creationId xmlns:a16="http://schemas.microsoft.com/office/drawing/2014/main" id="{073C9441-E7F6-4002-A686-4C8D35BE5C01}"/>
+              </a:ext>
+            </a:extLst>
+          </p:cNvPr>
+          <p:cNvPicPr>
+            <a:picLocks noChangeAspect="1"/>
+          </p:cNvPicPr>
+          <p:nvPr/>
+        </p:nvPicPr>
+        <p:blipFill>
+          <a:blip r:embed="rId4"/>
+          <a:stretch>
+            <a:fillRect/>
+          </a:stretch>
+        </p:blipFill>
+        <p:spPr>
+          <a:xfrm>
+            <a:off x="3170939" y="4213714"/>
+            <a:ext cx="2376209" cy="2376209"/>
+          </a:xfrm>
+          <a:prstGeom prst="rect">
+            <a:avLst/>
+          </a:prstGeom>
+        </p:spPr>
+      </p:pic>
+      <p:pic>
+        <p:nvPicPr>
+          <p:cNvPr id="8" name="Picture 7">
+            <a:extLst>
+              <a:ext uri="{FF2B5EF4-FFF2-40B4-BE49-F238E27FC236}">
+                <a16:creationId xmlns:a16="http://schemas.microsoft.com/office/drawing/2014/main" id="{4FB42088-0650-4728-821A-D20E8C045C45}"/>
+              </a:ext>
+            </a:extLst>
+          </p:cNvPr>
+          <p:cNvPicPr>
+            <a:picLocks noChangeAspect="1"/>
+          </p:cNvPicPr>
+          <p:nvPr/>
+        </p:nvPicPr>
+        <p:blipFill>
+          <a:blip r:embed="rId5"/>
+          <a:stretch>
+            <a:fillRect/>
+          </a:stretch>
+        </p:blipFill>
+        <p:spPr>
+          <a:xfrm>
+            <a:off x="731498" y="4346148"/>
+            <a:ext cx="2111343" cy="2111343"/>
+          </a:xfrm>
+          <a:prstGeom prst="rect">
+            <a:avLst/>
+          </a:prstGeom>
+        </p:spPr>
+      </p:pic>
     </p:spTree>
     <p:extLst>
       <p:ext uri="{BB962C8B-B14F-4D97-AF65-F5344CB8AC3E}">
         <p14:creationId xmlns:p14="http://schemas.microsoft.com/office/powerpoint/2010/main" val="2572307663"/>
+      </p:ext>
+    </p:extLst>
+  </p:cSld>
+  <p:clrMapOvr>
+    <a:masterClrMapping/>
+  </p:clrMapOvr>
+</p:sld>
+</file>
+
+<file path=ppt/slides/slide20.xml><?xml version="1.0" encoding="utf-8"?>
+<p:sld xmlns:a="http://schemas.openxmlformats.org/drawingml/2006/main" xmlns:r="http://schemas.openxmlformats.org/officeDocument/2006/relationships" xmlns:p="http://schemas.openxmlformats.org/presentationml/2006/main">
+  <p:cSld>
+    <p:spTree>
+      <p:nvGrpSpPr>
+        <p:cNvPr id="1" name=""/>
+        <p:cNvGrpSpPr/>
+        <p:nvPr/>
+      </p:nvGrpSpPr>
+      <p:grpSpPr>
+        <a:xfrm>
+          <a:off x="0" y="0"/>
+          <a:ext cx="0" cy="0"/>
+          <a:chOff x="0" y="0"/>
+          <a:chExt cx="0" cy="0"/>
+        </a:xfrm>
+      </p:grpSpPr>
+      <p:sp>
+        <p:nvSpPr>
+          <p:cNvPr id="2" name="Title 1">
+            <a:extLst>
+              <a:ext uri="{FF2B5EF4-FFF2-40B4-BE49-F238E27FC236}">
+                <a16:creationId xmlns:a16="http://schemas.microsoft.com/office/drawing/2014/main" id="{E999446A-6115-4AEB-94E8-77D3C971AD7B}"/>
+              </a:ext>
+            </a:extLst>
+          </p:cNvPr>
+          <p:cNvSpPr>
+            <a:spLocks noGrp="1"/>
+          </p:cNvSpPr>
+          <p:nvPr>
+            <p:ph type="title"/>
+          </p:nvPr>
+        </p:nvSpPr>
+        <p:spPr/>
+        <p:txBody>
+          <a:bodyPr/>
+          <a:lstStyle/>
+          <a:p>
+            <a:r>
+              <a:rPr lang="en-US" dirty="0"/>
+              <a:t>What can you do with this?</a:t>
+            </a:r>
+          </a:p>
+        </p:txBody>
+      </p:sp>
+      <p:sp>
+        <p:nvSpPr>
+          <p:cNvPr id="3" name="Content Placeholder 2">
+            <a:extLst>
+              <a:ext uri="{FF2B5EF4-FFF2-40B4-BE49-F238E27FC236}">
+                <a16:creationId xmlns:a16="http://schemas.microsoft.com/office/drawing/2014/main" id="{33C3DF4A-6F66-4A76-9785-A75FFE8CF1FA}"/>
+              </a:ext>
+            </a:extLst>
+          </p:cNvPr>
+          <p:cNvSpPr>
+            <a:spLocks noGrp="1"/>
+          </p:cNvSpPr>
+          <p:nvPr>
+            <p:ph idx="1"/>
+          </p:nvPr>
+        </p:nvSpPr>
+        <p:spPr/>
+        <p:txBody>
+          <a:bodyPr>
+            <a:normAutofit/>
+          </a:bodyPr>
+          <a:lstStyle/>
+          <a:p>
+            <a:r>
+              <a:rPr lang="en-US" sz="2800" dirty="0"/>
+              <a:t>Web 3.0- programs can be run on the blockchain</a:t>
+            </a:r>
+          </a:p>
+          <a:p>
+            <a:r>
+              <a:rPr lang="en-US" sz="2800" dirty="0"/>
+              <a:t>Create a node- participate in the network through mining</a:t>
+            </a:r>
+          </a:p>
+          <a:p>
+            <a:r>
+              <a:rPr lang="en-US" sz="2800" dirty="0"/>
+              <a:t>Create products using the blockchain (</a:t>
+            </a:r>
+            <a:r>
+              <a:rPr lang="en-US" sz="2800" dirty="0">
+                <a:hlinkClick r:id="rId2"/>
+              </a:rPr>
+              <a:t>https://etherscan.io/tokens</a:t>
+            </a:r>
+            <a:r>
+              <a:rPr lang="en-US" sz="2800" dirty="0"/>
+              <a:t>) </a:t>
+            </a:r>
+            <a:r>
+              <a:rPr lang="en-US" sz="2800" dirty="0" err="1"/>
+              <a:t>e.g</a:t>
+            </a:r>
+            <a:r>
+              <a:rPr lang="en-US" sz="2800" dirty="0"/>
+              <a:t> GOLEM</a:t>
+            </a:r>
+          </a:p>
+        </p:txBody>
+      </p:sp>
+      <p:pic>
+        <p:nvPicPr>
+          <p:cNvPr id="5" name="Picture 4">
+            <a:extLst>
+              <a:ext uri="{FF2B5EF4-FFF2-40B4-BE49-F238E27FC236}">
+                <a16:creationId xmlns:a16="http://schemas.microsoft.com/office/drawing/2014/main" id="{69478A1B-B12C-4BC4-9564-F7BDEBF7EEF6}"/>
+              </a:ext>
+            </a:extLst>
+          </p:cNvPr>
+          <p:cNvPicPr>
+            <a:picLocks noChangeAspect="1"/>
+          </p:cNvPicPr>
+          <p:nvPr/>
+        </p:nvPicPr>
+        <p:blipFill>
+          <a:blip r:embed="rId3"/>
+          <a:stretch>
+            <a:fillRect/>
+          </a:stretch>
+        </p:blipFill>
+        <p:spPr>
+          <a:xfrm>
+            <a:off x="768389" y="4425644"/>
+            <a:ext cx="2143125" cy="2143125"/>
+          </a:xfrm>
+          <a:prstGeom prst="rect">
+            <a:avLst/>
+          </a:prstGeom>
+        </p:spPr>
+      </p:pic>
+      <p:pic>
+        <p:nvPicPr>
+          <p:cNvPr id="7" name="Picture 6">
+            <a:extLst>
+              <a:ext uri="{FF2B5EF4-FFF2-40B4-BE49-F238E27FC236}">
+                <a16:creationId xmlns:a16="http://schemas.microsoft.com/office/drawing/2014/main" id="{999A9F53-400F-4235-809F-527A1359154E}"/>
+              </a:ext>
+            </a:extLst>
+          </p:cNvPr>
+          <p:cNvPicPr>
+            <a:picLocks noChangeAspect="1"/>
+          </p:cNvPicPr>
+          <p:nvPr/>
+        </p:nvPicPr>
+        <p:blipFill>
+          <a:blip r:embed="rId4"/>
+          <a:stretch>
+            <a:fillRect/>
+          </a:stretch>
+        </p:blipFill>
+        <p:spPr>
+          <a:xfrm>
+            <a:off x="2911514" y="4420589"/>
+            <a:ext cx="3589648" cy="2148180"/>
+          </a:xfrm>
+          <a:prstGeom prst="rect">
+            <a:avLst/>
+          </a:prstGeom>
+        </p:spPr>
+      </p:pic>
+      <p:pic>
+        <p:nvPicPr>
+          <p:cNvPr id="9" name="Picture 8">
+            <a:extLst>
+              <a:ext uri="{FF2B5EF4-FFF2-40B4-BE49-F238E27FC236}">
+                <a16:creationId xmlns:a16="http://schemas.microsoft.com/office/drawing/2014/main" id="{6B8190AE-4138-46C0-A234-2436F48B024D}"/>
+              </a:ext>
+            </a:extLst>
+          </p:cNvPr>
+          <p:cNvPicPr>
+            <a:picLocks noChangeAspect="1"/>
+          </p:cNvPicPr>
+          <p:nvPr/>
+        </p:nvPicPr>
+        <p:blipFill>
+          <a:blip r:embed="rId5"/>
+          <a:stretch>
+            <a:fillRect/>
+          </a:stretch>
+        </p:blipFill>
+        <p:spPr>
+          <a:xfrm>
+            <a:off x="6496107" y="4420589"/>
+            <a:ext cx="2148180" cy="2148180"/>
+          </a:xfrm>
+          <a:prstGeom prst="rect">
+            <a:avLst/>
+          </a:prstGeom>
+        </p:spPr>
+      </p:pic>
+    </p:spTree>
+    <p:extLst>
+      <p:ext uri="{BB962C8B-B14F-4D97-AF65-F5344CB8AC3E}">
+        <p14:creationId xmlns:p14="http://schemas.microsoft.com/office/powerpoint/2010/main" val="2214112828"/>
       </p:ext>
     </p:extLst>
   </p:cSld>
@@ -3923,6 +6176,242 @@
       </p:grpSpPr>
       <p:sp>
         <p:nvSpPr>
+          <p:cNvPr id="2" name="Title 1">
+            <a:extLst>
+              <a:ext uri="{FF2B5EF4-FFF2-40B4-BE49-F238E27FC236}">
+                <a16:creationId xmlns:a16="http://schemas.microsoft.com/office/drawing/2014/main" id="{2D73E1D9-7781-4303-8CB8-EF118A853AB9}"/>
+              </a:ext>
+            </a:extLst>
+          </p:cNvPr>
+          <p:cNvSpPr>
+            <a:spLocks noGrp="1"/>
+          </p:cNvSpPr>
+          <p:nvPr>
+            <p:ph type="title"/>
+          </p:nvPr>
+        </p:nvSpPr>
+        <p:spPr/>
+        <p:txBody>
+          <a:bodyPr/>
+          <a:lstStyle/>
+          <a:p>
+            <a:r>
+              <a:rPr lang="en-US" dirty="0"/>
+              <a:t>Let me dispel the rumors..</a:t>
+            </a:r>
+          </a:p>
+        </p:txBody>
+      </p:sp>
+      <p:pic>
+        <p:nvPicPr>
+          <p:cNvPr id="4" name="Picture 3">
+            <a:extLst>
+              <a:ext uri="{FF2B5EF4-FFF2-40B4-BE49-F238E27FC236}">
+                <a16:creationId xmlns:a16="http://schemas.microsoft.com/office/drawing/2014/main" id="{6846348E-CCC2-4CD8-89CD-D1C31585C327}"/>
+              </a:ext>
+            </a:extLst>
+          </p:cNvPr>
+          <p:cNvPicPr>
+            <a:picLocks noChangeAspect="1"/>
+          </p:cNvPicPr>
+          <p:nvPr/>
+        </p:nvPicPr>
+        <p:blipFill>
+          <a:blip r:embed="rId3"/>
+          <a:stretch>
+            <a:fillRect/>
+          </a:stretch>
+        </p:blipFill>
+        <p:spPr>
+          <a:xfrm>
+            <a:off x="685019" y="2139080"/>
+            <a:ext cx="7772401" cy="4080511"/>
+          </a:xfrm>
+          <a:prstGeom prst="rect">
+            <a:avLst/>
+          </a:prstGeom>
+        </p:spPr>
+      </p:pic>
+    </p:spTree>
+    <p:extLst>
+      <p:ext uri="{BB962C8B-B14F-4D97-AF65-F5344CB8AC3E}">
+        <p14:creationId xmlns:p14="http://schemas.microsoft.com/office/powerpoint/2010/main" val="316018096"/>
+      </p:ext>
+    </p:extLst>
+  </p:cSld>
+  <p:clrMapOvr>
+    <a:masterClrMapping/>
+  </p:clrMapOvr>
+</p:sld>
+</file>
+
+<file path=ppt/slides/slide4.xml><?xml version="1.0" encoding="utf-8"?>
+<p:sld xmlns:a="http://schemas.openxmlformats.org/drawingml/2006/main" xmlns:r="http://schemas.openxmlformats.org/officeDocument/2006/relationships" xmlns:p="http://schemas.openxmlformats.org/presentationml/2006/main">
+  <p:cSld>
+    <p:spTree>
+      <p:nvGrpSpPr>
+        <p:cNvPr id="1" name=""/>
+        <p:cNvGrpSpPr/>
+        <p:nvPr/>
+      </p:nvGrpSpPr>
+      <p:grpSpPr>
+        <a:xfrm>
+          <a:off x="0" y="0"/>
+          <a:ext cx="0" cy="0"/>
+          <a:chOff x="0" y="0"/>
+          <a:chExt cx="0" cy="0"/>
+        </a:xfrm>
+      </p:grpSpPr>
+      <p:sp>
+        <p:nvSpPr>
+          <p:cNvPr id="2" name="Title 1">
+            <a:extLst>
+              <a:ext uri="{FF2B5EF4-FFF2-40B4-BE49-F238E27FC236}">
+                <a16:creationId xmlns:a16="http://schemas.microsoft.com/office/drawing/2014/main" id="{C07091C8-B548-4066-B694-1DA0C18F3A32}"/>
+              </a:ext>
+            </a:extLst>
+          </p:cNvPr>
+          <p:cNvSpPr>
+            <a:spLocks noGrp="1"/>
+          </p:cNvSpPr>
+          <p:nvPr>
+            <p:ph type="title"/>
+          </p:nvPr>
+        </p:nvSpPr>
+        <p:spPr/>
+        <p:txBody>
+          <a:bodyPr/>
+          <a:lstStyle/>
+          <a:p>
+            <a:r>
+              <a:rPr lang="en-US" dirty="0"/>
+              <a:t>The history behind blockchain</a:t>
+            </a:r>
+          </a:p>
+        </p:txBody>
+      </p:sp>
+      <p:pic>
+        <p:nvPicPr>
+          <p:cNvPr id="5" name="Picture 4">
+            <a:extLst>
+              <a:ext uri="{FF2B5EF4-FFF2-40B4-BE49-F238E27FC236}">
+                <a16:creationId xmlns:a16="http://schemas.microsoft.com/office/drawing/2014/main" id="{99D8F267-98D2-4DC7-ABB9-C6E78EAB4B7D}"/>
+              </a:ext>
+            </a:extLst>
+          </p:cNvPr>
+          <p:cNvPicPr>
+            <a:picLocks noChangeAspect="1"/>
+          </p:cNvPicPr>
+          <p:nvPr/>
+        </p:nvPicPr>
+        <p:blipFill>
+          <a:blip r:embed="rId2"/>
+          <a:stretch>
+            <a:fillRect/>
+          </a:stretch>
+        </p:blipFill>
+        <p:spPr>
+          <a:xfrm>
+            <a:off x="190809" y="1792936"/>
+            <a:ext cx="4524246" cy="2544888"/>
+          </a:xfrm>
+          <a:prstGeom prst="rect">
+            <a:avLst/>
+          </a:prstGeom>
+        </p:spPr>
+      </p:pic>
+      <p:pic>
+        <p:nvPicPr>
+          <p:cNvPr id="6" name="Picture 5">
+            <a:extLst>
+              <a:ext uri="{FF2B5EF4-FFF2-40B4-BE49-F238E27FC236}">
+                <a16:creationId xmlns:a16="http://schemas.microsoft.com/office/drawing/2014/main" id="{BD6E8E1D-A933-4BDC-B5DD-C1095E93C32E}"/>
+              </a:ext>
+            </a:extLst>
+          </p:cNvPr>
+          <p:cNvPicPr>
+            <a:picLocks noChangeAspect="1"/>
+          </p:cNvPicPr>
+          <p:nvPr/>
+        </p:nvPicPr>
+        <p:blipFill>
+          <a:blip r:embed="rId3"/>
+          <a:stretch>
+            <a:fillRect/>
+          </a:stretch>
+        </p:blipFill>
+        <p:spPr>
+          <a:xfrm>
+            <a:off x="5477335" y="1905542"/>
+            <a:ext cx="2309620" cy="2309620"/>
+          </a:xfrm>
+          <a:prstGeom prst="rect">
+            <a:avLst/>
+          </a:prstGeom>
+        </p:spPr>
+      </p:pic>
+      <p:pic>
+        <p:nvPicPr>
+          <p:cNvPr id="8" name="Picture 7">
+            <a:extLst>
+              <a:ext uri="{FF2B5EF4-FFF2-40B4-BE49-F238E27FC236}">
+                <a16:creationId xmlns:a16="http://schemas.microsoft.com/office/drawing/2014/main" id="{B366E943-3E1F-4FD3-B394-9E91BC0C8DB7}"/>
+              </a:ext>
+            </a:extLst>
+          </p:cNvPr>
+          <p:cNvPicPr>
+            <a:picLocks noChangeAspect="1"/>
+          </p:cNvPicPr>
+          <p:nvPr/>
+        </p:nvPicPr>
+        <p:blipFill>
+          <a:blip r:embed="rId4"/>
+          <a:stretch>
+            <a:fillRect/>
+          </a:stretch>
+        </p:blipFill>
+        <p:spPr>
+          <a:xfrm>
+            <a:off x="2486722" y="4359706"/>
+            <a:ext cx="4687733" cy="2498294"/>
+          </a:xfrm>
+          <a:prstGeom prst="rect">
+            <a:avLst/>
+          </a:prstGeom>
+        </p:spPr>
+      </p:pic>
+    </p:spTree>
+    <p:extLst>
+      <p:ext uri="{BB962C8B-B14F-4D97-AF65-F5344CB8AC3E}">
+        <p14:creationId xmlns:p14="http://schemas.microsoft.com/office/powerpoint/2010/main" val="4083471174"/>
+      </p:ext>
+    </p:extLst>
+  </p:cSld>
+  <p:clrMapOvr>
+    <a:masterClrMapping/>
+  </p:clrMapOvr>
+</p:sld>
+</file>
+
+<file path=ppt/slides/slide5.xml><?xml version="1.0" encoding="utf-8"?>
+<p:sld xmlns:a="http://schemas.openxmlformats.org/drawingml/2006/main" xmlns:r="http://schemas.openxmlformats.org/officeDocument/2006/relationships" xmlns:p="http://schemas.openxmlformats.org/presentationml/2006/main">
+  <p:cSld>
+    <p:spTree>
+      <p:nvGrpSpPr>
+        <p:cNvPr id="1" name=""/>
+        <p:cNvGrpSpPr/>
+        <p:nvPr/>
+      </p:nvGrpSpPr>
+      <p:grpSpPr>
+        <a:xfrm>
+          <a:off x="0" y="0"/>
+          <a:ext cx="0" cy="0"/>
+          <a:chOff x="0" y="0"/>
+          <a:chExt cx="0" cy="0"/>
+        </a:xfrm>
+      </p:grpSpPr>
+      <p:sp>
+        <p:nvSpPr>
           <p:cNvPr id="4" name="Title 3">
             <a:extLst>
               <a:ext uri="{FF2B5EF4-FFF2-40B4-BE49-F238E27FC236}">
@@ -3949,28 +6438,98 @@
           </a:p>
         </p:txBody>
       </p:sp>
-      <p:sp>
-        <p:nvSpPr>
-          <p:cNvPr id="5" name="Content Placeholder 4">
+      <p:pic>
+        <p:nvPicPr>
+          <p:cNvPr id="3" name="Picture 2">
             <a:extLst>
               <a:ext uri="{FF2B5EF4-FFF2-40B4-BE49-F238E27FC236}">
-                <a16:creationId xmlns:a16="http://schemas.microsoft.com/office/drawing/2014/main" id="{2DB144FD-2A45-48F9-BD7B-3A09DDF5F92A}"/>
+                <a16:creationId xmlns:a16="http://schemas.microsoft.com/office/drawing/2014/main" id="{CAEEC133-925C-4960-9053-5F1261F6E31F}"/>
               </a:ext>
             </a:extLst>
           </p:cNvPr>
-          <p:cNvSpPr>
-            <a:spLocks noGrp="1"/>
-          </p:cNvSpPr>
-          <p:nvPr>
-            <p:ph idx="1"/>
-          </p:nvPr>
-        </p:nvSpPr>
-        <p:spPr/>
-        <p:txBody>
-          <a:bodyPr/>
-          <a:lstStyle/>
-          <a:p>
-            <a:endParaRPr lang="en-US"/>
+          <p:cNvPicPr>
+            <a:picLocks noChangeAspect="1"/>
+          </p:cNvPicPr>
+          <p:nvPr/>
+        </p:nvPicPr>
+        <p:blipFill>
+          <a:blip r:embed="rId3"/>
+          <a:stretch>
+            <a:fillRect/>
+          </a:stretch>
+        </p:blipFill>
+        <p:spPr>
+          <a:xfrm>
+            <a:off x="772632" y="2031016"/>
+            <a:ext cx="7597173" cy="3988516"/>
+          </a:xfrm>
+          <a:prstGeom prst="rect">
+            <a:avLst/>
+          </a:prstGeom>
+        </p:spPr>
+      </p:pic>
+      <p:sp>
+        <p:nvSpPr>
+          <p:cNvPr id="6" name="TextBox 5">
+            <a:extLst>
+              <a:ext uri="{FF2B5EF4-FFF2-40B4-BE49-F238E27FC236}">
+                <a16:creationId xmlns:a16="http://schemas.microsoft.com/office/drawing/2014/main" id="{D2C0740A-F519-4FC0-A41A-5F9479042BB1}"/>
+              </a:ext>
+            </a:extLst>
+          </p:cNvPr>
+          <p:cNvSpPr txBox="1"/>
+          <p:nvPr/>
+        </p:nvSpPr>
+        <p:spPr>
+          <a:xfrm>
+            <a:off x="1476941" y="6204492"/>
+            <a:ext cx="6188554" cy="369332"/>
+          </a:xfrm>
+          <a:prstGeom prst="rect">
+            <a:avLst/>
+          </a:prstGeom>
+          <a:noFill/>
+        </p:spPr>
+        <p:txBody>
+          <a:bodyPr wrap="none" rtlCol="0">
+            <a:spAutoFit/>
+          </a:bodyPr>
+          <a:lstStyle/>
+          <a:p>
+            <a:pPr marL="0" marR="0" lvl="0" indent="0" algn="l" defTabSz="457200" rtl="0" eaLnBrk="1" fontAlgn="auto" latinLnBrk="0" hangingPunct="1">
+              <a:lnSpc>
+                <a:spcPct val="100000"/>
+              </a:lnSpc>
+              <a:spcBef>
+                <a:spcPts val="0"/>
+              </a:spcBef>
+              <a:spcAft>
+                <a:spcPts val="0"/>
+              </a:spcAft>
+              <a:buClrTx/>
+              <a:buSzTx/>
+              <a:buFontTx/>
+              <a:buNone/>
+              <a:tabLst/>
+              <a:defRPr/>
+            </a:pPr>
+            <a:r>
+              <a:rPr kumimoji="0" lang="en-US" sz="1800" b="0" i="0" u="none" strike="noStrike" kern="1200" cap="none" spc="0" normalizeH="0" baseline="0" noProof="0" dirty="0">
+                <a:ln>
+                  <a:noFill/>
+                </a:ln>
+                <a:solidFill>
+                  <a:prstClr val="white"/>
+                </a:solidFill>
+                <a:effectLst/>
+                <a:uLnTx/>
+                <a:uFillTx/>
+                <a:latin typeface="Corbel" panose="020B0503020204020204"/>
+                <a:ea typeface="+mn-ea"/>
+                <a:cs typeface="+mn-cs"/>
+              </a:rPr>
+              <a:t>https://blockgeeks.com/guides/what-is-blockchain-technology/</a:t>
+            </a:r>
           </a:p>
         </p:txBody>
       </p:sp>
@@ -3978,6 +6537,570 @@
     <p:extLst>
       <p:ext uri="{BB962C8B-B14F-4D97-AF65-F5344CB8AC3E}">
         <p14:creationId xmlns:p14="http://schemas.microsoft.com/office/powerpoint/2010/main" val="3784328858"/>
+      </p:ext>
+    </p:extLst>
+  </p:cSld>
+  <p:clrMapOvr>
+    <a:masterClrMapping/>
+  </p:clrMapOvr>
+</p:sld>
+</file>
+
+<file path=ppt/slides/slide6.xml><?xml version="1.0" encoding="utf-8"?>
+<p:sld xmlns:a="http://schemas.openxmlformats.org/drawingml/2006/main" xmlns:r="http://schemas.openxmlformats.org/officeDocument/2006/relationships" xmlns:p="http://schemas.openxmlformats.org/presentationml/2006/main">
+  <p:cSld>
+    <p:spTree>
+      <p:nvGrpSpPr>
+        <p:cNvPr id="1" name=""/>
+        <p:cNvGrpSpPr/>
+        <p:nvPr/>
+      </p:nvGrpSpPr>
+      <p:grpSpPr>
+        <a:xfrm>
+          <a:off x="0" y="0"/>
+          <a:ext cx="0" cy="0"/>
+          <a:chOff x="0" y="0"/>
+          <a:chExt cx="0" cy="0"/>
+        </a:xfrm>
+      </p:grpSpPr>
+      <p:sp>
+        <p:nvSpPr>
+          <p:cNvPr id="2" name="Title 1">
+            <a:extLst>
+              <a:ext uri="{FF2B5EF4-FFF2-40B4-BE49-F238E27FC236}">
+                <a16:creationId xmlns:a16="http://schemas.microsoft.com/office/drawing/2014/main" id="{FFFF3FB1-88FC-4C39-A575-DBEF7E9824A0}"/>
+              </a:ext>
+            </a:extLst>
+          </p:cNvPr>
+          <p:cNvSpPr>
+            <a:spLocks noGrp="1"/>
+          </p:cNvSpPr>
+          <p:nvPr>
+            <p:ph type="title"/>
+          </p:nvPr>
+        </p:nvSpPr>
+        <p:spPr/>
+        <p:txBody>
+          <a:bodyPr/>
+          <a:lstStyle/>
+          <a:p>
+            <a:r>
+              <a:rPr lang="en-US" dirty="0"/>
+              <a:t>Why use blockchain?</a:t>
+            </a:r>
+          </a:p>
+        </p:txBody>
+      </p:sp>
+      <p:sp>
+        <p:nvSpPr>
+          <p:cNvPr id="3" name="Content Placeholder 2">
+            <a:extLst>
+              <a:ext uri="{FF2B5EF4-FFF2-40B4-BE49-F238E27FC236}">
+                <a16:creationId xmlns:a16="http://schemas.microsoft.com/office/drawing/2014/main" id="{C81E15DB-95F5-4D78-84BA-852B89012AC0}"/>
+              </a:ext>
+            </a:extLst>
+          </p:cNvPr>
+          <p:cNvSpPr>
+            <a:spLocks noGrp="1"/>
+          </p:cNvSpPr>
+          <p:nvPr>
+            <p:ph idx="1"/>
+          </p:nvPr>
+        </p:nvSpPr>
+        <p:spPr>
+          <a:xfrm>
+            <a:off x="685019" y="2000528"/>
+            <a:ext cx="7772400" cy="4206240"/>
+          </a:xfrm>
+        </p:spPr>
+        <p:txBody>
+          <a:bodyPr/>
+          <a:lstStyle/>
+          <a:p>
+            <a:r>
+              <a:rPr lang="en-US" sz="3200" dirty="0"/>
+              <a:t>Almost entirely decentralized</a:t>
+            </a:r>
+          </a:p>
+          <a:p>
+            <a:r>
+              <a:rPr lang="en-US" sz="3200" dirty="0"/>
+              <a:t>Most likely security breach is human error</a:t>
+            </a:r>
+          </a:p>
+          <a:p>
+            <a:r>
+              <a:rPr lang="en-US" sz="3200" dirty="0"/>
+              <a:t>Highly secure</a:t>
+            </a:r>
+          </a:p>
+          <a:p>
+            <a:r>
+              <a:rPr lang="en-US" sz="3200" dirty="0"/>
+              <a:t>More “power to the people”</a:t>
+            </a:r>
+          </a:p>
+          <a:p>
+            <a:r>
+              <a:rPr lang="en-US" sz="3200" dirty="0"/>
+              <a:t>Extended abilities as a decentralized computer</a:t>
+            </a:r>
+          </a:p>
+          <a:p>
+            <a:endParaRPr lang="en-US" dirty="0"/>
+          </a:p>
+        </p:txBody>
+      </p:sp>
+      <p:pic>
+        <p:nvPicPr>
+          <p:cNvPr id="5" name="Picture 4">
+            <a:extLst>
+              <a:ext uri="{FF2B5EF4-FFF2-40B4-BE49-F238E27FC236}">
+                <a16:creationId xmlns:a16="http://schemas.microsoft.com/office/drawing/2014/main" id="{34D55FF5-8EC9-44C6-BE96-8F16ABF8163A}"/>
+              </a:ext>
+            </a:extLst>
+          </p:cNvPr>
+          <p:cNvPicPr>
+            <a:picLocks noChangeAspect="1"/>
+          </p:cNvPicPr>
+          <p:nvPr/>
+        </p:nvPicPr>
+        <p:blipFill>
+          <a:blip r:embed="rId2"/>
+          <a:stretch>
+            <a:fillRect/>
+          </a:stretch>
+        </p:blipFill>
+        <p:spPr>
+          <a:xfrm>
+            <a:off x="2932769" y="4922174"/>
+            <a:ext cx="5988205" cy="1863343"/>
+          </a:xfrm>
+          <a:prstGeom prst="rect">
+            <a:avLst/>
+          </a:prstGeom>
+        </p:spPr>
+      </p:pic>
+    </p:spTree>
+    <p:extLst>
+      <p:ext uri="{BB962C8B-B14F-4D97-AF65-F5344CB8AC3E}">
+        <p14:creationId xmlns:p14="http://schemas.microsoft.com/office/powerpoint/2010/main" val="3197694747"/>
+      </p:ext>
+    </p:extLst>
+  </p:cSld>
+  <p:clrMapOvr>
+    <a:masterClrMapping/>
+  </p:clrMapOvr>
+</p:sld>
+</file>
+
+<file path=ppt/slides/slide7.xml><?xml version="1.0" encoding="utf-8"?>
+<p:sld xmlns:a="http://schemas.openxmlformats.org/drawingml/2006/main" xmlns:r="http://schemas.openxmlformats.org/officeDocument/2006/relationships" xmlns:p="http://schemas.openxmlformats.org/presentationml/2006/main">
+  <p:cSld>
+    <p:spTree>
+      <p:nvGrpSpPr>
+        <p:cNvPr id="1" name=""/>
+        <p:cNvGrpSpPr/>
+        <p:nvPr/>
+      </p:nvGrpSpPr>
+      <p:grpSpPr>
+        <a:xfrm>
+          <a:off x="0" y="0"/>
+          <a:ext cx="0" cy="0"/>
+          <a:chOff x="0" y="0"/>
+          <a:chExt cx="0" cy="0"/>
+        </a:xfrm>
+      </p:grpSpPr>
+      <p:sp>
+        <p:nvSpPr>
+          <p:cNvPr id="2" name="Title 1">
+            <a:extLst>
+              <a:ext uri="{FF2B5EF4-FFF2-40B4-BE49-F238E27FC236}">
+                <a16:creationId xmlns:a16="http://schemas.microsoft.com/office/drawing/2014/main" id="{32E1D8A8-6F8C-4A10-BE2A-61532C7CEAF9}"/>
+              </a:ext>
+            </a:extLst>
+          </p:cNvPr>
+          <p:cNvSpPr>
+            <a:spLocks noGrp="1"/>
+          </p:cNvSpPr>
+          <p:nvPr>
+            <p:ph type="title"/>
+          </p:nvPr>
+        </p:nvSpPr>
+        <p:spPr/>
+        <p:txBody>
+          <a:bodyPr/>
+          <a:lstStyle/>
+          <a:p>
+            <a:r>
+              <a:rPr lang="en-US" dirty="0"/>
+              <a:t>Decentralization (Pros)</a:t>
+            </a:r>
+          </a:p>
+        </p:txBody>
+      </p:sp>
+      <p:sp>
+        <p:nvSpPr>
+          <p:cNvPr id="3" name="Content Placeholder 2">
+            <a:extLst>
+              <a:ext uri="{FF2B5EF4-FFF2-40B4-BE49-F238E27FC236}">
+                <a16:creationId xmlns:a16="http://schemas.microsoft.com/office/drawing/2014/main" id="{89C99DE0-4D5E-4C28-A243-9E5A04079E55}"/>
+              </a:ext>
+            </a:extLst>
+          </p:cNvPr>
+          <p:cNvSpPr>
+            <a:spLocks noGrp="1"/>
+          </p:cNvSpPr>
+          <p:nvPr>
+            <p:ph idx="1"/>
+          </p:nvPr>
+        </p:nvSpPr>
+        <p:spPr/>
+        <p:txBody>
+          <a:bodyPr>
+            <a:normAutofit lnSpcReduction="10000"/>
+          </a:bodyPr>
+          <a:lstStyle/>
+          <a:p>
+            <a:r>
+              <a:rPr lang="en-US" sz="3200" dirty="0"/>
+              <a:t>No one sets the rules except for what is agreed upon by the network (Forks)</a:t>
+            </a:r>
+          </a:p>
+          <a:p>
+            <a:r>
+              <a:rPr lang="en-US" sz="3200" dirty="0"/>
+              <a:t>Very difficult to hack</a:t>
+            </a:r>
+          </a:p>
+          <a:p>
+            <a:r>
+              <a:rPr lang="en-US" sz="3200" dirty="0"/>
+              <a:t>Everything is transparent</a:t>
+            </a:r>
+          </a:p>
+          <a:p>
+            <a:r>
+              <a:rPr lang="en-US" sz="3200" dirty="0"/>
+              <a:t>Anonymity</a:t>
+            </a:r>
+          </a:p>
+          <a:p>
+            <a:r>
+              <a:rPr lang="en-US" sz="3200" dirty="0"/>
+              <a:t>Supply</a:t>
+            </a:r>
+          </a:p>
+          <a:p>
+            <a:r>
+              <a:rPr lang="en-US" sz="3200" dirty="0"/>
+              <a:t>Not determined by government or singular entity</a:t>
+            </a:r>
+          </a:p>
+          <a:p>
+            <a:endParaRPr lang="en-US" dirty="0"/>
+          </a:p>
+          <a:p>
+            <a:endParaRPr lang="en-US" dirty="0"/>
+          </a:p>
+        </p:txBody>
+      </p:sp>
+      <p:pic>
+        <p:nvPicPr>
+          <p:cNvPr id="5" name="Picture 4">
+            <a:extLst>
+              <a:ext uri="{FF2B5EF4-FFF2-40B4-BE49-F238E27FC236}">
+                <a16:creationId xmlns:a16="http://schemas.microsoft.com/office/drawing/2014/main" id="{3FE642BA-8454-45DA-88B5-547503759B19}"/>
+              </a:ext>
+            </a:extLst>
+          </p:cNvPr>
+          <p:cNvPicPr>
+            <a:picLocks noChangeAspect="1"/>
+          </p:cNvPicPr>
+          <p:nvPr/>
+        </p:nvPicPr>
+        <p:blipFill>
+          <a:blip r:embed="rId2"/>
+          <a:stretch>
+            <a:fillRect/>
+          </a:stretch>
+        </p:blipFill>
+        <p:spPr>
+          <a:xfrm>
+            <a:off x="5858444" y="2998888"/>
+            <a:ext cx="2814602" cy="2231824"/>
+          </a:xfrm>
+          <a:prstGeom prst="rect">
+            <a:avLst/>
+          </a:prstGeom>
+        </p:spPr>
+      </p:pic>
+    </p:spTree>
+    <p:extLst>
+      <p:ext uri="{BB962C8B-B14F-4D97-AF65-F5344CB8AC3E}">
+        <p14:creationId xmlns:p14="http://schemas.microsoft.com/office/powerpoint/2010/main" val="830048524"/>
+      </p:ext>
+    </p:extLst>
+  </p:cSld>
+  <p:clrMapOvr>
+    <a:masterClrMapping/>
+  </p:clrMapOvr>
+</p:sld>
+</file>
+
+<file path=ppt/slides/slide8.xml><?xml version="1.0" encoding="utf-8"?>
+<p:sld xmlns:a="http://schemas.openxmlformats.org/drawingml/2006/main" xmlns:r="http://schemas.openxmlformats.org/officeDocument/2006/relationships" xmlns:p="http://schemas.openxmlformats.org/presentationml/2006/main">
+  <p:cSld>
+    <p:spTree>
+      <p:nvGrpSpPr>
+        <p:cNvPr id="1" name=""/>
+        <p:cNvGrpSpPr/>
+        <p:nvPr/>
+      </p:nvGrpSpPr>
+      <p:grpSpPr>
+        <a:xfrm>
+          <a:off x="0" y="0"/>
+          <a:ext cx="0" cy="0"/>
+          <a:chOff x="0" y="0"/>
+          <a:chExt cx="0" cy="0"/>
+        </a:xfrm>
+      </p:grpSpPr>
+      <p:sp>
+        <p:nvSpPr>
+          <p:cNvPr id="2" name="Title 1">
+            <a:extLst>
+              <a:ext uri="{FF2B5EF4-FFF2-40B4-BE49-F238E27FC236}">
+                <a16:creationId xmlns:a16="http://schemas.microsoft.com/office/drawing/2014/main" id="{0F9FF3BB-7B67-4617-8ECE-65E6E090FC39}"/>
+              </a:ext>
+            </a:extLst>
+          </p:cNvPr>
+          <p:cNvSpPr>
+            <a:spLocks noGrp="1"/>
+          </p:cNvSpPr>
+          <p:nvPr>
+            <p:ph type="title"/>
+          </p:nvPr>
+        </p:nvSpPr>
+        <p:spPr/>
+        <p:txBody>
+          <a:bodyPr/>
+          <a:lstStyle/>
+          <a:p>
+            <a:r>
+              <a:rPr lang="en-US" dirty="0"/>
+              <a:t>Decentralization (Cons)</a:t>
+            </a:r>
+          </a:p>
+        </p:txBody>
+      </p:sp>
+      <p:sp>
+        <p:nvSpPr>
+          <p:cNvPr id="3" name="Content Placeholder 2">
+            <a:extLst>
+              <a:ext uri="{FF2B5EF4-FFF2-40B4-BE49-F238E27FC236}">
+                <a16:creationId xmlns:a16="http://schemas.microsoft.com/office/drawing/2014/main" id="{BD84543F-E5D7-4844-A8DD-C8D2DCB98539}"/>
+              </a:ext>
+            </a:extLst>
+          </p:cNvPr>
+          <p:cNvSpPr>
+            <a:spLocks noGrp="1"/>
+          </p:cNvSpPr>
+          <p:nvPr>
+            <p:ph idx="1"/>
+          </p:nvPr>
+        </p:nvSpPr>
+        <p:spPr/>
+        <p:txBody>
+          <a:bodyPr/>
+          <a:lstStyle/>
+          <a:p>
+            <a:r>
+              <a:rPr lang="en-US" sz="3200" dirty="0"/>
+              <a:t>Is completely dependent upon it’s users (May not exist in the far future)</a:t>
+            </a:r>
+          </a:p>
+          <a:p>
+            <a:r>
+              <a:rPr lang="en-US" sz="3200" dirty="0"/>
+              <a:t>Government intervention</a:t>
+            </a:r>
+          </a:p>
+          <a:p>
+            <a:r>
+              <a:rPr lang="en-US" sz="3200" dirty="0"/>
+              <a:t>Much of the security is dependent on the individual</a:t>
+            </a:r>
+          </a:p>
+          <a:p>
+            <a:endParaRPr lang="en-US" dirty="0"/>
+          </a:p>
+        </p:txBody>
+      </p:sp>
+      <p:pic>
+        <p:nvPicPr>
+          <p:cNvPr id="5" name="Picture 4">
+            <a:extLst>
+              <a:ext uri="{FF2B5EF4-FFF2-40B4-BE49-F238E27FC236}">
+                <a16:creationId xmlns:a16="http://schemas.microsoft.com/office/drawing/2014/main" id="{051C2ED6-BFE2-4C36-AC87-238D48D9616B}"/>
+              </a:ext>
+            </a:extLst>
+          </p:cNvPr>
+          <p:cNvPicPr>
+            <a:picLocks noChangeAspect="1"/>
+          </p:cNvPicPr>
+          <p:nvPr/>
+        </p:nvPicPr>
+        <p:blipFill>
+          <a:blip r:embed="rId2"/>
+          <a:stretch>
+            <a:fillRect/>
+          </a:stretch>
+        </p:blipFill>
+        <p:spPr>
+          <a:xfrm>
+            <a:off x="4092497" y="4212452"/>
+            <a:ext cx="4449336" cy="2478280"/>
+          </a:xfrm>
+          <a:prstGeom prst="rect">
+            <a:avLst/>
+          </a:prstGeom>
+        </p:spPr>
+      </p:pic>
+    </p:spTree>
+    <p:extLst>
+      <p:ext uri="{BB962C8B-B14F-4D97-AF65-F5344CB8AC3E}">
+        <p14:creationId xmlns:p14="http://schemas.microsoft.com/office/powerpoint/2010/main" val="1383468726"/>
+      </p:ext>
+    </p:extLst>
+  </p:cSld>
+  <p:clrMapOvr>
+    <a:masterClrMapping/>
+  </p:clrMapOvr>
+</p:sld>
+</file>
+
+<file path=ppt/slides/slide9.xml><?xml version="1.0" encoding="utf-8"?>
+<p:sld xmlns:a="http://schemas.openxmlformats.org/drawingml/2006/main" xmlns:r="http://schemas.openxmlformats.org/officeDocument/2006/relationships" xmlns:p="http://schemas.openxmlformats.org/presentationml/2006/main">
+  <p:cSld>
+    <p:spTree>
+      <p:nvGrpSpPr>
+        <p:cNvPr id="1" name=""/>
+        <p:cNvGrpSpPr/>
+        <p:nvPr/>
+      </p:nvGrpSpPr>
+      <p:grpSpPr>
+        <a:xfrm>
+          <a:off x="0" y="0"/>
+          <a:ext cx="0" cy="0"/>
+          <a:chOff x="0" y="0"/>
+          <a:chExt cx="0" cy="0"/>
+        </a:xfrm>
+      </p:grpSpPr>
+      <p:sp>
+        <p:nvSpPr>
+          <p:cNvPr id="2" name="Title 1">
+            <a:extLst>
+              <a:ext uri="{FF2B5EF4-FFF2-40B4-BE49-F238E27FC236}">
+                <a16:creationId xmlns:a16="http://schemas.microsoft.com/office/drawing/2014/main" id="{4FCEBDF0-C348-4E14-8275-BF84A1F869BB}"/>
+              </a:ext>
+            </a:extLst>
+          </p:cNvPr>
+          <p:cNvSpPr>
+            <a:spLocks noGrp="1"/>
+          </p:cNvSpPr>
+          <p:nvPr>
+            <p:ph type="title"/>
+          </p:nvPr>
+        </p:nvSpPr>
+        <p:spPr/>
+        <p:txBody>
+          <a:bodyPr/>
+          <a:lstStyle/>
+          <a:p>
+            <a:r>
+              <a:rPr lang="en-US" dirty="0"/>
+              <a:t>Validation (Proof of work)</a:t>
+            </a:r>
+          </a:p>
+        </p:txBody>
+      </p:sp>
+      <p:sp>
+        <p:nvSpPr>
+          <p:cNvPr id="3" name="Content Placeholder 2">
+            <a:extLst>
+              <a:ext uri="{FF2B5EF4-FFF2-40B4-BE49-F238E27FC236}">
+                <a16:creationId xmlns:a16="http://schemas.microsoft.com/office/drawing/2014/main" id="{079EB185-89E8-476D-9EBB-D5B787A4FFC1}"/>
+              </a:ext>
+            </a:extLst>
+          </p:cNvPr>
+          <p:cNvSpPr>
+            <a:spLocks noGrp="1"/>
+          </p:cNvSpPr>
+          <p:nvPr>
+            <p:ph idx="1"/>
+          </p:nvPr>
+        </p:nvSpPr>
+        <p:spPr/>
+        <p:txBody>
+          <a:bodyPr/>
+          <a:lstStyle/>
+          <a:p>
+            <a:r>
+              <a:rPr lang="en-US" dirty="0"/>
+              <a:t>Every block is a set of transactions during a certain period of time</a:t>
+            </a:r>
+          </a:p>
+          <a:p>
+            <a:r>
+              <a:rPr lang="en-US" dirty="0"/>
+              <a:t>Expensive computer calculations called “mining” validates each block in exchange for newly created currency</a:t>
+            </a:r>
+          </a:p>
+          <a:p>
+            <a:r>
+              <a:rPr lang="en-US" dirty="0"/>
+              <a:t>Cryptocurrency is not the first place POW is used</a:t>
+            </a:r>
+          </a:p>
+          <a:p>
+            <a:endParaRPr lang="en-US" dirty="0"/>
+          </a:p>
+        </p:txBody>
+      </p:sp>
+      <p:pic>
+        <p:nvPicPr>
+          <p:cNvPr id="7" name="Picture 6">
+            <a:extLst>
+              <a:ext uri="{FF2B5EF4-FFF2-40B4-BE49-F238E27FC236}">
+                <a16:creationId xmlns:a16="http://schemas.microsoft.com/office/drawing/2014/main" id="{FB218C19-334A-40E6-AB66-ECA8C5A1B5B2}"/>
+              </a:ext>
+            </a:extLst>
+          </p:cNvPr>
+          <p:cNvPicPr>
+            <a:picLocks noChangeAspect="1"/>
+          </p:cNvPicPr>
+          <p:nvPr/>
+        </p:nvPicPr>
+        <p:blipFill>
+          <a:blip r:embed="rId2"/>
+          <a:stretch>
+            <a:fillRect/>
+          </a:stretch>
+        </p:blipFill>
+        <p:spPr>
+          <a:xfrm>
+            <a:off x="891700" y="4307577"/>
+            <a:ext cx="6959107" cy="1910343"/>
+          </a:xfrm>
+          <a:prstGeom prst="rect">
+            <a:avLst/>
+          </a:prstGeom>
+        </p:spPr>
+      </p:pic>
+    </p:spTree>
+    <p:extLst>
+      <p:ext uri="{BB962C8B-B14F-4D97-AF65-F5344CB8AC3E}">
+        <p14:creationId xmlns:p14="http://schemas.microsoft.com/office/powerpoint/2010/main" val="2630200820"/>
       </p:ext>
     </p:extLst>
   </p:cSld>

</xml_diff>